<commit_message>
Klaar voor de competitie
</commit_message>
<xml_diff>
--- a/2018-2019/Smell Cube/Documenten/Presentatie.pptx
+++ b/2018-2019/Smell Cube/Documenten/Presentatie.pptx
@@ -6,11 +6,13 @@
   </p:sldMasterIdLst>
   <p:sldIdLst>
     <p:sldId id="256" r:id="rId2"/>
-    <p:sldId id="257" r:id="rId3"/>
-    <p:sldId id="258" r:id="rId4"/>
-    <p:sldId id="259" r:id="rId5"/>
-    <p:sldId id="260" r:id="rId6"/>
-    <p:sldId id="261" r:id="rId7"/>
+    <p:sldId id="270" r:id="rId3"/>
+    <p:sldId id="264" r:id="rId4"/>
+    <p:sldId id="265" r:id="rId5"/>
+    <p:sldId id="266" r:id="rId6"/>
+    <p:sldId id="267" r:id="rId7"/>
+    <p:sldId id="268" r:id="rId8"/>
+    <p:sldId id="269" r:id="rId9"/>
   </p:sldIdLst>
   <p:sldSz cx="12192000" cy="6858000"/>
   <p:notesSz cx="6858000" cy="9144000"/>
@@ -109,6 +111,11 @@
       </a:defRPr>
     </a:lvl9pPr>
   </p:defaultTextStyle>
+  <p:extLst>
+    <p:ext uri="{EFAFB233-063F-42B5-8137-9DF3F51BA10A}">
+      <p15:sldGuideLst xmlns:p15="http://schemas.microsoft.com/office/powerpoint/2012/main"/>
+    </p:ext>
+  </p:extLst>
 </p:presentation>
 </file>
 
@@ -515,7 +522,7 @@
           <a:p>
             <a:fld id="{83284890-85D2-4D7B-8EF5-15A9C1DB8F42}" type="datetimeFigureOut">
               <a:rPr lang="en-US" dirty="0"/>
-              <a:t>3/13/2019</a:t>
+              <a:t>4/8/2019</a:t>
             </a:fld>
             <a:endParaRPr lang="en-US" dirty="0"/>
           </a:p>
@@ -690,7 +697,7 @@
           <a:p>
             <a:fld id="{87157CC2-0FC8-4686-B024-99790E0F5162}" type="datetimeFigureOut">
               <a:rPr lang="en-US" dirty="0"/>
-              <a:t>3/13/2019</a:t>
+              <a:t>4/8/2019</a:t>
             </a:fld>
             <a:endParaRPr lang="en-US" dirty="0"/>
           </a:p>
@@ -865,7 +872,7 @@
           <a:p>
             <a:fld id="{F6764DA5-CD3D-4590-A511-FCD3BC7A793E}" type="datetimeFigureOut">
               <a:rPr lang="en-US" dirty="0"/>
-              <a:t>3/13/2019</a:t>
+              <a:t>4/8/2019</a:t>
             </a:fld>
             <a:endParaRPr lang="en-US" dirty="0"/>
           </a:p>
@@ -1030,7 +1037,7 @@
           <a:p>
             <a:fld id="{82F5661D-6934-4B32-B92C-470368BF1EC6}" type="datetimeFigureOut">
               <a:rPr lang="en-US" dirty="0"/>
-              <a:t>3/13/2019</a:t>
+              <a:t>4/8/2019</a:t>
             </a:fld>
             <a:endParaRPr lang="en-US" dirty="0"/>
           </a:p>
@@ -1338,7 +1345,7 @@
           <a:p>
             <a:fld id="{C6F822A4-8DA6-4447-9B1F-C5DB58435268}" type="datetimeFigureOut">
               <a:rPr lang="en-US" dirty="0"/>
-              <a:t>3/13/2019</a:t>
+              <a:t>4/8/2019</a:t>
             </a:fld>
             <a:endParaRPr lang="en-US" dirty="0"/>
           </a:p>
@@ -1720,7 +1727,7 @@
           <a:p>
             <a:fld id="{E548D31E-DCDA-41A7-9C67-C4B11B94D21D}" type="datetimeFigureOut">
               <a:rPr lang="en-US" dirty="0"/>
-              <a:t>3/13/2019</a:t>
+              <a:t>4/8/2019</a:t>
             </a:fld>
             <a:endParaRPr lang="en-US" dirty="0"/>
           </a:p>
@@ -2149,7 +2156,7 @@
           <a:p>
             <a:fld id="{9B3762C0-B258-48F1-ADE6-176B4174CCDD}" type="datetimeFigureOut">
               <a:rPr lang="en-US" dirty="0"/>
-              <a:t>3/13/2019</a:t>
+              <a:t>4/8/2019</a:t>
             </a:fld>
             <a:endParaRPr lang="en-US" dirty="0"/>
           </a:p>
@@ -2262,7 +2269,7 @@
           <a:p>
             <a:fld id="{677919A6-33EB-49BD-A62F-1FA56B9F9712}" type="datetimeFigureOut">
               <a:rPr lang="en-US" dirty="0"/>
-              <a:t>3/13/2019</a:t>
+              <a:t>4/8/2019</a:t>
             </a:fld>
             <a:endParaRPr lang="en-US" dirty="0"/>
           </a:p>
@@ -2352,7 +2359,7 @@
           <a:p>
             <a:fld id="{CA4E7D1B-D673-4CF6-8672-009D42ABD2A0}" type="datetimeFigureOut">
               <a:rPr lang="en-US" dirty="0"/>
-              <a:t>3/13/2019</a:t>
+              <a:t>4/8/2019</a:t>
             </a:fld>
             <a:endParaRPr lang="en-US" dirty="0"/>
           </a:p>
@@ -2697,7 +2704,7 @@
           <a:p>
             <a:fld id="{DA16AA21-1863-4931-97CB-99D0A168701B}" type="datetimeFigureOut">
               <a:rPr lang="en-US" dirty="0"/>
-              <a:t>3/13/2019</a:t>
+              <a:t>4/8/2019</a:t>
             </a:fld>
             <a:endParaRPr lang="en-US" dirty="0"/>
           </a:p>
@@ -3117,7 +3124,7 @@
           <a:p>
             <a:fld id="{3772C379-9A7C-4C87-A116-CBE9F58B04C5}" type="datetimeFigureOut">
               <a:rPr lang="en-US" dirty="0"/>
-              <a:t>3/13/2019</a:t>
+              <a:t>4/8/2019</a:t>
             </a:fld>
             <a:endParaRPr lang="en-US" dirty="0"/>
           </a:p>
@@ -3393,7 +3400,7 @@
           <a:p>
             <a:fld id="{8664C608-40B1-4030-A28D-5B74BC98ADCE}" type="datetimeFigureOut">
               <a:rPr lang="en-US" dirty="0"/>
-              <a:t>3/13/2019</a:t>
+              <a:t>4/8/2019</a:t>
             </a:fld>
             <a:endParaRPr lang="en-US" dirty="0"/>
           </a:p>
@@ -3955,7 +3962,7 @@
     <p:bg>
       <p:bgPr>
         <a:solidFill>
-          <a:schemeClr val="bg1"/>
+          <a:srgbClr val="00CDFF"/>
         </a:solidFill>
         <a:effectLst/>
       </p:bgPr>
@@ -4163,8 +4170,16 @@
           <a:p>
             <a:pPr algn="r"/>
             <a:r>
-              <a:rPr lang="nl-NL" sz="8800"/>
-              <a:t> The smell project </a:t>
+              <a:rPr lang="nl-NL" sz="8800" dirty="0"/>
+              <a:t> The </a:t>
+            </a:r>
+            <a:r>
+              <a:rPr lang="nl-NL" sz="8800" dirty="0" err="1"/>
+              <a:t>smell</a:t>
+            </a:r>
+            <a:r>
+              <a:rPr lang="nl-NL" sz="8800" dirty="0"/>
+              <a:t> project </a:t>
             </a:r>
           </a:p>
         </p:txBody>
@@ -4441,27 +4456,105 @@
         </p:nvSpPr>
         <p:spPr>
           <a:xfrm>
-            <a:off x="8095025" y="2064730"/>
-            <a:ext cx="2728540" cy="2728536"/>
+            <a:off x="8103988" y="2588066"/>
+            <a:ext cx="2728540" cy="2047195"/>
           </a:xfrm>
         </p:spPr>
         <p:txBody>
           <a:bodyPr anchor="ctr">
-            <a:normAutofit/>
+            <a:normAutofit lnSpcReduction="10000"/>
           </a:bodyPr>
           <a:lstStyle/>
           <a:p>
             <a:pPr algn="ctr"/>
             <a:r>
-              <a:rPr lang="nl-NL">
+              <a:rPr lang="nl-NL" dirty="0">
                 <a:solidFill>
                   <a:srgbClr val="FFFFFF"/>
                 </a:solidFill>
-                <a:latin typeface="+mj-lt"/>
-              </a:rPr>
-              <a:t>Gemaakt door: Rodrigo Das Dores Pedro / Ömer Yildirim</a:t>
-            </a:r>
-            <a:endParaRPr lang="nl-NL">
+              </a:rPr>
+              <a:t>  </a:t>
+            </a:r>
+            <a:r>
+              <a:rPr lang="nl-NL" dirty="0" err="1">
+                <a:solidFill>
+                  <a:srgbClr val="FFFFFF"/>
+                </a:solidFill>
+              </a:rPr>
+              <a:t>Ekrem</a:t>
+            </a:r>
+            <a:endParaRPr lang="nl-NL" dirty="0">
+              <a:solidFill>
+                <a:srgbClr val="FFFFFF"/>
+              </a:solidFill>
+            </a:endParaRPr>
+          </a:p>
+          <a:p>
+            <a:pPr algn="ctr"/>
+            <a:r>
+              <a:rPr lang="nl-NL" dirty="0">
+                <a:solidFill>
+                  <a:srgbClr val="FFFFFF"/>
+                </a:solidFill>
+              </a:rPr>
+              <a:t>Jesse</a:t>
+            </a:r>
+          </a:p>
+          <a:p>
+            <a:pPr marL="342900" indent="-342900" algn="ctr">
+              <a:buFontTx/>
+              <a:buChar char="-"/>
+            </a:pPr>
+            <a:r>
+              <a:rPr lang="nl-NL" dirty="0" err="1">
+                <a:solidFill>
+                  <a:srgbClr val="FFFFFF"/>
+                </a:solidFill>
+              </a:rPr>
+              <a:t>Naoufal</a:t>
+            </a:r>
+            <a:endParaRPr lang="nl-NL" dirty="0">
+              <a:solidFill>
+                <a:srgbClr val="FFFFFF"/>
+              </a:solidFill>
+            </a:endParaRPr>
+          </a:p>
+          <a:p>
+            <a:pPr algn="ctr"/>
+            <a:r>
+              <a:rPr lang="nl-NL" dirty="0" err="1">
+                <a:solidFill>
+                  <a:srgbClr val="FFFFFF"/>
+                </a:solidFill>
+              </a:rPr>
+              <a:t>Ömer</a:t>
+            </a:r>
+            <a:endParaRPr lang="nl-NL" dirty="0">
+              <a:solidFill>
+                <a:srgbClr val="FFFFFF"/>
+              </a:solidFill>
+            </a:endParaRPr>
+          </a:p>
+          <a:p>
+            <a:pPr marL="342900" indent="-342900" algn="ctr">
+              <a:buFontTx/>
+              <a:buChar char="-"/>
+            </a:pPr>
+            <a:r>
+              <a:rPr lang="nl-NL" dirty="0">
+                <a:solidFill>
+                  <a:srgbClr val="FFFFFF"/>
+                </a:solidFill>
+              </a:rPr>
+              <a:t>Rodrigo</a:t>
+            </a:r>
+          </a:p>
+          <a:p>
+            <a:pPr marL="342900" indent="-342900" algn="ctr">
+              <a:buFontTx/>
+              <a:buChar char="-"/>
+            </a:pPr>
+            <a:endParaRPr lang="nl-NL" dirty="0">
               <a:solidFill>
                 <a:srgbClr val="FFFFFF"/>
               </a:solidFill>
@@ -4488,7 +4581,7 @@
     <p:bg>
       <p:bgPr>
         <a:solidFill>
-          <a:schemeClr val="bg1"/>
+          <a:srgbClr val="00CDFF"/>
         </a:solidFill>
         <a:effectLst/>
       </p:bgPr>
@@ -4507,12 +4600,161 @@
           <a:chExt cx="0" cy="0"/>
         </a:xfrm>
       </p:grpSpPr>
+      <p:sp>
+        <p:nvSpPr>
+          <p:cNvPr id="2" name="Titel 1">
+            <a:extLst>
+              <a:ext uri="{FF2B5EF4-FFF2-40B4-BE49-F238E27FC236}">
+                <a16:creationId xmlns:a16="http://schemas.microsoft.com/office/drawing/2014/main" id="{0E347300-351F-429F-A196-FCDAF015CC5E}"/>
+              </a:ext>
+            </a:extLst>
+          </p:cNvPr>
+          <p:cNvSpPr>
+            <a:spLocks noGrp="1"/>
+          </p:cNvSpPr>
+          <p:nvPr>
+            <p:ph type="title"/>
+          </p:nvPr>
+        </p:nvSpPr>
+        <p:spPr>
+          <a:xfrm>
+            <a:off x="1069848" y="484632"/>
+            <a:ext cx="10058400" cy="1609344"/>
+          </a:xfrm>
+        </p:spPr>
+        <p:txBody>
+          <a:bodyPr anchor="ctr">
+            <a:normAutofit/>
+          </a:bodyPr>
+          <a:lstStyle/>
+          <a:p>
+            <a:r>
+              <a:rPr lang="nl-NL">
+                <a:solidFill>
+                  <a:schemeClr val="tx1"/>
+                </a:solidFill>
+              </a:rPr>
+              <a:t>Inhoudsopgave </a:t>
+            </a:r>
+          </a:p>
+        </p:txBody>
+      </p:sp>
+      <p:sp>
+        <p:nvSpPr>
+          <p:cNvPr id="3" name="Tijdelijke aanduiding voor inhoud 2">
+            <a:extLst>
+              <a:ext uri="{FF2B5EF4-FFF2-40B4-BE49-F238E27FC236}">
+                <a16:creationId xmlns:a16="http://schemas.microsoft.com/office/drawing/2014/main" id="{96A30566-7AAF-492B-B4BB-505A071847C5}"/>
+              </a:ext>
+            </a:extLst>
+          </p:cNvPr>
+          <p:cNvSpPr>
+            <a:spLocks noGrp="1"/>
+          </p:cNvSpPr>
+          <p:nvPr>
+            <p:ph idx="1"/>
+          </p:nvPr>
+        </p:nvSpPr>
+        <p:spPr>
+          <a:xfrm>
+            <a:off x="1069848" y="2121408"/>
+            <a:ext cx="10058400" cy="2243558"/>
+          </a:xfrm>
+        </p:spPr>
+        <p:txBody>
+          <a:bodyPr>
+            <a:normAutofit fontScale="92500" lnSpcReduction="20000"/>
+          </a:bodyPr>
+          <a:lstStyle/>
+          <a:p>
+            <a:r>
+              <a:rPr lang="nl-NL" sz="2800" dirty="0">
+                <a:latin typeface="+mj-lt"/>
+              </a:rPr>
+              <a:t>Demonstratie</a:t>
+            </a:r>
+          </a:p>
+          <a:p>
+            <a:r>
+              <a:rPr lang="nl-NL" sz="2800" dirty="0">
+                <a:latin typeface="+mj-lt"/>
+              </a:rPr>
+              <a:t>Voor wie is de </a:t>
+            </a:r>
+            <a:r>
+              <a:rPr lang="nl-NL" sz="2800" dirty="0" err="1">
+                <a:latin typeface="+mj-lt"/>
+              </a:rPr>
+              <a:t>Smell</a:t>
+            </a:r>
+            <a:r>
+              <a:rPr lang="nl-NL" sz="2800" dirty="0">
+                <a:latin typeface="+mj-lt"/>
+              </a:rPr>
+              <a:t> Cube gemaakt</a:t>
+            </a:r>
+          </a:p>
+          <a:p>
+            <a:r>
+              <a:rPr lang="nl-NL" sz="2800" dirty="0">
+                <a:latin typeface="+mj-lt"/>
+              </a:rPr>
+              <a:t>Wat kun je met de </a:t>
+            </a:r>
+            <a:r>
+              <a:rPr lang="nl-NL" sz="2800" dirty="0" err="1">
+                <a:latin typeface="+mj-lt"/>
+              </a:rPr>
+              <a:t>Smell</a:t>
+            </a:r>
+            <a:r>
+              <a:rPr lang="nl-NL" sz="2800" dirty="0">
+                <a:latin typeface="+mj-lt"/>
+              </a:rPr>
+              <a:t> Cube</a:t>
+            </a:r>
+          </a:p>
+          <a:p>
+            <a:r>
+              <a:rPr lang="nl-NL" sz="2800" dirty="0">
+                <a:latin typeface="+mj-lt"/>
+              </a:rPr>
+              <a:t>Hoe is de </a:t>
+            </a:r>
+            <a:r>
+              <a:rPr lang="nl-NL" sz="2800" dirty="0" err="1">
+                <a:latin typeface="+mj-lt"/>
+              </a:rPr>
+              <a:t>Smell</a:t>
+            </a:r>
+            <a:r>
+              <a:rPr lang="nl-NL" sz="2800" dirty="0">
+                <a:latin typeface="+mj-lt"/>
+              </a:rPr>
+              <a:t> Cube gemaakt</a:t>
+            </a:r>
+          </a:p>
+          <a:p>
+            <a:r>
+              <a:rPr lang="nl-NL" sz="2800" dirty="0">
+                <a:latin typeface="+mj-lt"/>
+              </a:rPr>
+              <a:t>Verbeteringen in de toekomst</a:t>
+            </a:r>
+          </a:p>
+          <a:p>
+            <a:endParaRPr lang="nl-NL" sz="2800" dirty="0">
+              <a:latin typeface="+mj-lt"/>
+            </a:endParaRPr>
+          </a:p>
+        </p:txBody>
+      </p:sp>
       <p:pic>
         <p:nvPicPr>
-          <p:cNvPr id="5" name="Afbeelding 4" descr="Afbeelding met tekst&#10;&#10;Beschrijving is gegenereerd met hoge betrouwbaarheid">
+          <p:cNvPr id="5" name="Afbeelding 4">
             <a:extLst>
               <a:ext uri="{FF2B5EF4-FFF2-40B4-BE49-F238E27FC236}">
-                <a16:creationId xmlns:a16="http://schemas.microsoft.com/office/drawing/2014/main" id="{61E11374-B88A-43D3-9450-F49428A0E93D}"/>
+                <a16:creationId xmlns:a16="http://schemas.microsoft.com/office/drawing/2014/main" id="{172F7597-0663-4BDB-B68D-3ED3A8780DC5}"/>
               </a:ext>
             </a:extLst>
           </p:cNvPr>
@@ -4523,479 +4765,28 @@
         </p:nvPicPr>
         <p:blipFill rotWithShape="1">
           <a:blip r:embed="rId2"/>
-          <a:srcRect t="14449"/>
+          <a:srcRect l="9961" r="21128"/>
           <a:stretch/>
         </p:blipFill>
         <p:spPr>
           <a:xfrm>
-            <a:off x="20" y="11"/>
-            <a:ext cx="12191980" cy="6857989"/>
+            <a:off x="6467168" y="2093976"/>
+            <a:ext cx="4278900" cy="3492722"/>
           </a:xfrm>
           <a:prstGeom prst="rect">
             <a:avLst/>
           </a:prstGeom>
         </p:spPr>
       </p:pic>
-      <p:sp>
-        <p:nvSpPr>
-          <p:cNvPr id="10" name="Rectangle 9">
-            <a:extLst>
-              <a:ext uri="{FF2B5EF4-FFF2-40B4-BE49-F238E27FC236}">
-                <a16:creationId xmlns:a16="http://schemas.microsoft.com/office/drawing/2014/main" id="{F79FF99C-BAA9-404F-9C96-6DD456B4F795}"/>
-              </a:ext>
-              <a:ext uri="{C183D7F6-B498-43B3-948B-1728B52AA6E4}">
-                <adec:decorative xmlns:adec="http://schemas.microsoft.com/office/drawing/2017/decorative" val="1"/>
-              </a:ext>
-            </a:extLst>
-          </p:cNvPr>
-          <p:cNvSpPr>
-            <a:spLocks noGrp="1" noRot="1" noChangeAspect="1" noMove="1" noResize="1" noEditPoints="1" noAdjustHandles="1" noChangeArrowheads="1" noChangeShapeType="1" noTextEdit="1"/>
-          </p:cNvSpPr>
-          <p:nvPr>
-            <p:extLst>
-              <p:ext uri="{386F3935-93C4-4BCD-93E2-E3B085C9AB24}">
-                <p16:designElem xmlns:p16="http://schemas.microsoft.com/office/powerpoint/2015/main" val="1"/>
-              </p:ext>
-            </p:extLst>
-          </p:nvPr>
-        </p:nvSpPr>
-        <p:spPr>
-          <a:xfrm>
-            <a:off x="0" y="1"/>
-            <a:ext cx="12192000" cy="6857999"/>
-          </a:xfrm>
-          <a:prstGeom prst="rect">
-            <a:avLst/>
-          </a:prstGeom>
-          <a:solidFill>
-            <a:schemeClr val="bg1">
-              <a:alpha val="20000"/>
-            </a:schemeClr>
-          </a:solidFill>
-          <a:ln>
-            <a:noFill/>
-          </a:ln>
-        </p:spPr>
-        <p:style>
-          <a:lnRef idx="2">
-            <a:schemeClr val="accent1">
-              <a:shade val="50000"/>
-            </a:schemeClr>
-          </a:lnRef>
-          <a:fillRef idx="1">
-            <a:schemeClr val="accent1"/>
-          </a:fillRef>
-          <a:effectRef idx="0">
-            <a:schemeClr val="accent1"/>
-          </a:effectRef>
-          <a:fontRef idx="minor">
-            <a:schemeClr val="lt1"/>
-          </a:fontRef>
-        </p:style>
-        <p:txBody>
-          <a:bodyPr rtlCol="0" anchor="ctr"/>
-          <a:lstStyle/>
-          <a:p>
-            <a:pPr algn="ctr"/>
-            <a:endParaRPr lang="en-US"/>
-          </a:p>
-        </p:txBody>
-      </p:sp>
-      <p:sp>
-        <p:nvSpPr>
-          <p:cNvPr id="12" name="Rectangle 11">
-            <a:extLst>
-              <a:ext uri="{FF2B5EF4-FFF2-40B4-BE49-F238E27FC236}">
-                <a16:creationId xmlns:a16="http://schemas.microsoft.com/office/drawing/2014/main" id="{49C44AFD-C72D-4D9C-84C6-73E615CED884}"/>
-              </a:ext>
-              <a:ext uri="{C183D7F6-B498-43B3-948B-1728B52AA6E4}">
-                <adec:decorative xmlns:adec="http://schemas.microsoft.com/office/drawing/2017/decorative" val="1"/>
-              </a:ext>
-            </a:extLst>
-          </p:cNvPr>
-          <p:cNvSpPr>
-            <a:spLocks noGrp="1" noRot="1" noChangeAspect="1" noMove="1" noResize="1" noEditPoints="1" noAdjustHandles="1" noChangeArrowheads="1" noChangeShapeType="1" noTextEdit="1"/>
-          </p:cNvSpPr>
-          <p:nvPr>
-            <p:extLst>
-              <p:ext uri="{386F3935-93C4-4BCD-93E2-E3B085C9AB24}">
-                <p16:designElem xmlns:p16="http://schemas.microsoft.com/office/powerpoint/2015/main" val="1"/>
-              </p:ext>
-            </p:extLst>
-          </p:nvPr>
-        </p:nvSpPr>
-        <p:spPr>
-          <a:xfrm>
-            <a:off x="1524" y="0"/>
-            <a:ext cx="12188952" cy="6858000"/>
-          </a:xfrm>
-          <a:prstGeom prst="rect">
-            <a:avLst/>
-          </a:prstGeom>
-          <a:blipFill dpi="0" rotWithShape="1">
-            <a:blip r:embed="rId3">
-              <a:alphaModFix amt="30000"/>
-              <a:duotone>
-                <a:prstClr val="black"/>
-                <a:schemeClr val="accent1">
-                  <a:tint val="45000"/>
-                  <a:satMod val="400000"/>
-                </a:schemeClr>
-              </a:duotone>
-              <a:extLst>
-                <a:ext uri="{BEBA8EAE-BF5A-486C-A8C5-ECC9F3942E4B}">
-                  <a14:imgProps xmlns:a14="http://schemas.microsoft.com/office/drawing/2010/main">
-                    <a14:imgLayer r:embed="rId4">
-                      <a14:imgEffect>
-                        <a14:sharpenSoften amount="61000"/>
-                      </a14:imgEffect>
-                      <a14:imgEffect>
-                        <a14:brightnessContrast bright="-25000" contrast="20000"/>
-                      </a14:imgEffect>
-                    </a14:imgLayer>
-                  </a14:imgProps>
-                </a:ext>
-                <a:ext uri="{28A0092B-C50C-407E-A947-70E740481C1C}">
-                  <a14:useLocalDpi xmlns:a14="http://schemas.microsoft.com/office/drawing/2010/main" val="0"/>
-                </a:ext>
-              </a:extLst>
-            </a:blip>
-            <a:srcRect/>
-            <a:tile tx="0" ty="-762000" sx="92000" sy="89000" flip="xy" algn="ctr"/>
-          </a:blipFill>
-          <a:ln>
-            <a:noFill/>
-          </a:ln>
-        </p:spPr>
-        <p:style>
-          <a:lnRef idx="2">
-            <a:schemeClr val="accent1">
-              <a:shade val="50000"/>
-            </a:schemeClr>
-          </a:lnRef>
-          <a:fillRef idx="1">
-            <a:schemeClr val="accent1"/>
-          </a:fillRef>
-          <a:effectRef idx="0">
-            <a:schemeClr val="accent1"/>
-          </a:effectRef>
-          <a:fontRef idx="minor">
-            <a:schemeClr val="lt1"/>
-          </a:fontRef>
-        </p:style>
-        <p:txBody>
-          <a:bodyPr rtlCol="0" anchor="ctr"/>
-          <a:lstStyle/>
-          <a:p>
-            <a:pPr algn="ctr"/>
-            <a:endParaRPr lang="en-US"/>
-          </a:p>
-        </p:txBody>
-      </p:sp>
-      <p:sp>
-        <p:nvSpPr>
-          <p:cNvPr id="2" name="Titel 1">
-            <a:extLst>
-              <a:ext uri="{FF2B5EF4-FFF2-40B4-BE49-F238E27FC236}">
-                <a16:creationId xmlns:a16="http://schemas.microsoft.com/office/drawing/2014/main" id="{0E347300-351F-429F-A196-FCDAF015CC5E}"/>
-              </a:ext>
-            </a:extLst>
-          </p:cNvPr>
-          <p:cNvSpPr>
-            <a:spLocks noGrp="1"/>
-          </p:cNvSpPr>
-          <p:nvPr>
-            <p:ph type="title"/>
-          </p:nvPr>
-        </p:nvSpPr>
-        <p:spPr>
-          <a:xfrm>
-            <a:off x="1069848" y="484632"/>
-            <a:ext cx="10058400" cy="1609344"/>
-          </a:xfrm>
-        </p:spPr>
-        <p:txBody>
-          <a:bodyPr anchor="ctr">
-            <a:normAutofit/>
-          </a:bodyPr>
-          <a:lstStyle/>
-          <a:p>
-            <a:r>
-              <a:rPr lang="nl-NL">
-                <a:solidFill>
-                  <a:schemeClr val="tx1"/>
-                </a:solidFill>
-              </a:rPr>
-              <a:t>Inhoudsopgave </a:t>
-            </a:r>
-          </a:p>
-        </p:txBody>
-      </p:sp>
-      <p:sp>
-        <p:nvSpPr>
-          <p:cNvPr id="3" name="Tijdelijke aanduiding voor inhoud 2">
-            <a:extLst>
-              <a:ext uri="{FF2B5EF4-FFF2-40B4-BE49-F238E27FC236}">
-                <a16:creationId xmlns:a16="http://schemas.microsoft.com/office/drawing/2014/main" id="{96A30566-7AAF-492B-B4BB-505A071847C5}"/>
-              </a:ext>
-            </a:extLst>
-          </p:cNvPr>
-          <p:cNvSpPr>
-            <a:spLocks noGrp="1"/>
-          </p:cNvSpPr>
-          <p:nvPr>
-            <p:ph idx="1"/>
-          </p:nvPr>
-        </p:nvSpPr>
-        <p:spPr>
-          <a:xfrm>
-            <a:off x="1069848" y="2121408"/>
-            <a:ext cx="10058400" cy="4050792"/>
-          </a:xfrm>
-        </p:spPr>
-        <p:txBody>
-          <a:bodyPr>
-            <a:normAutofit/>
-          </a:bodyPr>
-          <a:lstStyle/>
-          <a:p>
-            <a:r>
-              <a:rPr lang="nl-NL" sz="2800" dirty="0">
-                <a:latin typeface="+mj-lt"/>
-              </a:rPr>
-              <a:t>Jesse programeerder</a:t>
-            </a:r>
-          </a:p>
-          <a:p>
-            <a:r>
-              <a:rPr lang="nl-NL" sz="2800" dirty="0">
-                <a:latin typeface="+mj-lt"/>
-              </a:rPr>
-              <a:t>Ekrem en Ömer ontwerper  (Jesse back-up)</a:t>
-            </a:r>
-          </a:p>
-          <a:p>
-            <a:r>
-              <a:rPr lang="nl-NL" sz="2800" dirty="0">
-                <a:latin typeface="+mj-lt"/>
-              </a:rPr>
-              <a:t>Rodrigo en Nouafal schrijven (Ömer back-up)</a:t>
-            </a:r>
-          </a:p>
-          <a:p>
-            <a:r>
-              <a:rPr lang="nl-NL" sz="2800" dirty="0">
-                <a:latin typeface="+mj-lt"/>
-              </a:rPr>
-              <a:t>Hoe is het contact van ons team en hoe werken we samen en zijn we nog compleet?</a:t>
-            </a:r>
-          </a:p>
-        </p:txBody>
-      </p:sp>
-      <p:grpSp>
-        <p:nvGrpSpPr>
-          <p:cNvPr id="14" name="Group 13">
-            <a:extLst>
-              <a:ext uri="{FF2B5EF4-FFF2-40B4-BE49-F238E27FC236}">
-                <a16:creationId xmlns:a16="http://schemas.microsoft.com/office/drawing/2014/main" id="{1D25B14F-36E0-41E8-956F-CABEF1ADD65F}"/>
-              </a:ext>
-              <a:ext uri="{C183D7F6-B498-43B3-948B-1728B52AA6E4}">
-                <adec:decorative xmlns:adec="http://schemas.microsoft.com/office/drawing/2017/decorative" val="1"/>
-              </a:ext>
-            </a:extLst>
-          </p:cNvPr>
-          <p:cNvGrpSpPr>
-            <a:grpSpLocks noGrp="1" noUngrp="1" noRot="1" noChangeAspect="1" noMove="1" noResize="1"/>
-          </p:cNvGrpSpPr>
-          <p:nvPr>
-            <p:extLst>
-              <p:ext uri="{386F3935-93C4-4BCD-93E2-E3B085C9AB24}">
-                <p16:designElem xmlns:p16="http://schemas.microsoft.com/office/powerpoint/2015/main" val="1"/>
-              </p:ext>
-            </p:extLst>
-          </p:nvPr>
-        </p:nvGrpSpPr>
-        <p:grpSpPr>
-          <a:xfrm>
-            <a:off x="11401725" y="6229681"/>
-            <a:ext cx="457200" cy="457200"/>
-            <a:chOff x="11361456" y="6195813"/>
-            <a:chExt cx="548640" cy="548640"/>
-          </a:xfrm>
-        </p:grpSpPr>
-        <p:sp>
-          <p:nvSpPr>
-            <p:cNvPr id="15" name="Oval 14">
-              <a:extLst>
-                <a:ext uri="{FF2B5EF4-FFF2-40B4-BE49-F238E27FC236}">
-                  <a16:creationId xmlns:a16="http://schemas.microsoft.com/office/drawing/2014/main" id="{4AFB9EA5-DE4D-4E6B-A302-F55174E4B19A}"/>
-                </a:ext>
-                <a:ext uri="{C183D7F6-B498-43B3-948B-1728B52AA6E4}">
-                  <adec:decorative xmlns:adec="http://schemas.microsoft.com/office/drawing/2017/decorative" val="1"/>
-                </a:ext>
-              </a:extLst>
-            </p:cNvPr>
-            <p:cNvSpPr/>
-            <p:nvPr>
-              <p:extLst>
-                <p:ext uri="{386F3935-93C4-4BCD-93E2-E3B085C9AB24}">
-                  <p16:designElem xmlns:p16="http://schemas.microsoft.com/office/powerpoint/2015/main" val="1"/>
-                </p:ext>
-              </p:extLst>
-            </p:nvPr>
-          </p:nvSpPr>
-          <p:spPr>
-            <a:xfrm>
-              <a:off x="11361456" y="6195813"/>
-              <a:ext cx="548640" cy="548640"/>
-            </a:xfrm>
-            <a:prstGeom prst="ellipse">
-              <a:avLst/>
-            </a:prstGeom>
-            <a:blipFill dpi="0" rotWithShape="1">
-              <a:blip r:embed="rId5">
-                <a:duotone>
-                  <a:schemeClr val="accent1">
-                    <a:shade val="45000"/>
-                    <a:satMod val="135000"/>
-                  </a:schemeClr>
-                  <a:prstClr val="white"/>
-                </a:duotone>
-                <a:extLst/>
-              </a:blip>
-              <a:srcRect/>
-              <a:tile tx="50800" ty="0" sx="85000" sy="85000" flip="none" algn="tl"/>
-            </a:blipFill>
-            <a:ln w="25400" cap="flat" cmpd="sng" algn="ctr">
-              <a:noFill/>
-              <a:prstDash val="solid"/>
-            </a:ln>
-            <a:effectLst/>
-          </p:spPr>
-          <p:txBody>
-            <a:bodyPr lIns="0" tIns="0" rIns="0" bIns="0" rtlCol="0" anchor="ctr"/>
-            <a:lstStyle/>
-            <a:p>
-              <a:pPr marL="0" marR="0" lvl="0" indent="0" algn="ctr" defTabSz="914400" eaLnBrk="1" fontAlgn="auto" latinLnBrk="0" hangingPunct="1">
-                <a:lnSpc>
-                  <a:spcPct val="100000"/>
-                </a:lnSpc>
-                <a:spcBef>
-                  <a:spcPts val="0"/>
-                </a:spcBef>
-                <a:spcAft>
-                  <a:spcPts val="0"/>
-                </a:spcAft>
-                <a:buClrTx/>
-                <a:buSzTx/>
-                <a:buFontTx/>
-                <a:buNone/>
-                <a:tabLst/>
-                <a:defRPr/>
-              </a:pPr>
-              <a:endParaRPr kumimoji="0" lang="en-US" sz="2000" b="0" i="0" u="none" strike="noStrike" kern="0" cap="none" spc="0" normalizeH="0" baseline="0" noProof="0" dirty="0">
-                <a:ln>
-                  <a:noFill/>
-                </a:ln>
-                <a:solidFill>
-                  <a:prstClr val="white"/>
-                </a:solidFill>
-                <a:effectLst/>
-                <a:uLnTx/>
-                <a:uFillTx/>
-                <a:latin typeface="Rockwell Extra Bold" pitchFamily="18" charset="0"/>
-                <a:ea typeface="+mn-ea"/>
-                <a:cs typeface="+mn-cs"/>
-              </a:endParaRPr>
-            </a:p>
-          </p:txBody>
-        </p:sp>
-        <p:sp>
-          <p:nvSpPr>
-            <p:cNvPr id="16" name="Oval 15">
-              <a:extLst>
-                <a:ext uri="{FF2B5EF4-FFF2-40B4-BE49-F238E27FC236}">
-                  <a16:creationId xmlns:a16="http://schemas.microsoft.com/office/drawing/2014/main" id="{E44092F4-4D9B-4D0A-8832-C29E786F8F03}"/>
-                </a:ext>
-                <a:ext uri="{C183D7F6-B498-43B3-948B-1728B52AA6E4}">
-                  <adec:decorative xmlns:adec="http://schemas.microsoft.com/office/drawing/2017/decorative" val="1"/>
-                </a:ext>
-              </a:extLst>
-            </p:cNvPr>
-            <p:cNvSpPr/>
-            <p:nvPr>
-              <p:extLst>
-                <p:ext uri="{386F3935-93C4-4BCD-93E2-E3B085C9AB24}">
-                  <p16:designElem xmlns:p16="http://schemas.microsoft.com/office/powerpoint/2015/main" val="1"/>
-                </p:ext>
-              </p:extLst>
-            </p:nvPr>
-          </p:nvSpPr>
-          <p:spPr>
-            <a:xfrm>
-              <a:off x="11396488" y="6230844"/>
-              <a:ext cx="478576" cy="478578"/>
-            </a:xfrm>
-            <a:prstGeom prst="ellipse">
-              <a:avLst/>
-            </a:prstGeom>
-            <a:noFill/>
-            <a:ln w="12700" cap="flat" cmpd="sng" algn="ctr">
-              <a:solidFill>
-                <a:srgbClr val="FFFFFF"/>
-              </a:solidFill>
-              <a:prstDash val="solid"/>
-            </a:ln>
-            <a:effectLst/>
-          </p:spPr>
-          <p:txBody>
-            <a:bodyPr rtlCol="0" anchor="ctr"/>
-            <a:lstStyle/>
-            <a:p>
-              <a:pPr marL="0" marR="0" lvl="0" indent="0" algn="ctr" defTabSz="914400" eaLnBrk="1" fontAlgn="auto" latinLnBrk="0" hangingPunct="1">
-                <a:lnSpc>
-                  <a:spcPct val="100000"/>
-                </a:lnSpc>
-                <a:spcBef>
-                  <a:spcPts val="0"/>
-                </a:spcBef>
-                <a:spcAft>
-                  <a:spcPts val="0"/>
-                </a:spcAft>
-                <a:buClrTx/>
-                <a:buSzTx/>
-                <a:buFontTx/>
-                <a:buNone/>
-                <a:tabLst/>
-                <a:defRPr/>
-              </a:pPr>
-              <a:endParaRPr kumimoji="0" lang="en-US" sz="1800" b="0" i="0" u="none" strike="noStrike" kern="0" cap="none" spc="0" normalizeH="0" baseline="0" noProof="0" dirty="0">
-                <a:ln>
-                  <a:noFill/>
-                </a:ln>
-                <a:solidFill>
-                  <a:prstClr val="white"/>
-                </a:solidFill>
-                <a:effectLst/>
-                <a:uLnTx/>
-                <a:uFillTx/>
-                <a:latin typeface="Calibri"/>
-                <a:ea typeface="+mn-ea"/>
-                <a:cs typeface="+mn-cs"/>
-              </a:endParaRPr>
-            </a:p>
-          </p:txBody>
-        </p:sp>
-      </p:grpSp>
     </p:spTree>
     <p:extLst>
       <p:ext uri="{BB962C8B-B14F-4D97-AF65-F5344CB8AC3E}">
-        <p14:creationId xmlns:p14="http://schemas.microsoft.com/office/powerpoint/2010/main" val="2656031201"/>
+        <p14:creationId xmlns:p14="http://schemas.microsoft.com/office/powerpoint/2010/main" val="3044581294"/>
       </p:ext>
     </p:extLst>
   </p:cSld>
   <p:clrMapOvr>
-    <a:overrideClrMapping bg1="dk1" tx1="lt1" bg2="dk2" tx2="lt2" accent1="accent1" accent2="accent2" accent3="accent3" accent4="accent4" accent5="accent5" accent6="accent6" hlink="hlink" folHlink="folHlink"/>
+    <a:masterClrMapping/>
   </p:clrMapOvr>
 </p:sld>
 </file>
@@ -5006,7 +4797,7 @@
     <p:bg>
       <p:bgPr>
         <a:solidFill>
-          <a:schemeClr val="bg1"/>
+          <a:srgbClr val="00CDFF"/>
         </a:solidFill>
         <a:effectLst/>
       </p:bgPr>
@@ -5025,12 +4816,51 @@
           <a:chExt cx="0" cy="0"/>
         </a:xfrm>
       </p:grpSpPr>
+      <p:sp>
+        <p:nvSpPr>
+          <p:cNvPr id="2" name="Titel 1">
+            <a:extLst>
+              <a:ext uri="{FF2B5EF4-FFF2-40B4-BE49-F238E27FC236}">
+                <a16:creationId xmlns:a16="http://schemas.microsoft.com/office/drawing/2014/main" id="{0E347300-351F-429F-A196-FCDAF015CC5E}"/>
+              </a:ext>
+            </a:extLst>
+          </p:cNvPr>
+          <p:cNvSpPr>
+            <a:spLocks noGrp="1"/>
+          </p:cNvSpPr>
+          <p:nvPr>
+            <p:ph type="title"/>
+          </p:nvPr>
+        </p:nvSpPr>
+        <p:spPr>
+          <a:xfrm>
+            <a:off x="1069848" y="484632"/>
+            <a:ext cx="10058400" cy="1609344"/>
+          </a:xfrm>
+        </p:spPr>
+        <p:txBody>
+          <a:bodyPr anchor="ctr">
+            <a:normAutofit/>
+          </a:bodyPr>
+          <a:lstStyle/>
+          <a:p>
+            <a:r>
+              <a:rPr lang="nl-NL" dirty="0">
+                <a:solidFill>
+                  <a:schemeClr val="tx1"/>
+                </a:solidFill>
+              </a:rPr>
+              <a:t>Demonstratie </a:t>
+            </a:r>
+          </a:p>
+        </p:txBody>
+      </p:sp>
       <p:pic>
         <p:nvPicPr>
-          <p:cNvPr id="5" name="Afbeelding 4" descr="Afbeelding met tekst&#10;&#10;Beschrijving is gegenereerd met zeer hoge betrouwbaarheid">
+          <p:cNvPr id="4" name="Afbeelding 3">
             <a:extLst>
               <a:ext uri="{FF2B5EF4-FFF2-40B4-BE49-F238E27FC236}">
-                <a16:creationId xmlns:a16="http://schemas.microsoft.com/office/drawing/2014/main" id="{16EF29AE-4D47-4CB1-8E50-423102634CA6}"/>
+                <a16:creationId xmlns:a16="http://schemas.microsoft.com/office/drawing/2014/main" id="{B518EBE7-45EE-4409-AD8B-6CE12AD2E458}"/>
               </a:ext>
             </a:extLst>
           </p:cNvPr>
@@ -5039,457 +4869,31 @@
           </p:cNvPicPr>
           <p:nvPr/>
         </p:nvPicPr>
-        <p:blipFill rotWithShape="1">
+        <p:blipFill>
           <a:blip r:embed="rId2"/>
-          <a:srcRect t="9448" b="6283"/>
-          <a:stretch/>
+          <a:stretch>
+            <a:fillRect/>
+          </a:stretch>
         </p:blipFill>
         <p:spPr>
           <a:xfrm>
-            <a:off x="3068" y="11"/>
-            <a:ext cx="12191980" cy="6857989"/>
+            <a:off x="6331855" y="679819"/>
+            <a:ext cx="4436047" cy="5684405"/>
           </a:xfrm>
           <a:prstGeom prst="rect">
             <a:avLst/>
           </a:prstGeom>
         </p:spPr>
       </p:pic>
-      <p:sp>
-        <p:nvSpPr>
-          <p:cNvPr id="10" name="Rectangle 9">
-            <a:extLst>
-              <a:ext uri="{FF2B5EF4-FFF2-40B4-BE49-F238E27FC236}">
-                <a16:creationId xmlns:a16="http://schemas.microsoft.com/office/drawing/2014/main" id="{F79FF99C-BAA9-404F-9C96-6DD456B4F795}"/>
-              </a:ext>
-              <a:ext uri="{C183D7F6-B498-43B3-948B-1728B52AA6E4}">
-                <adec:decorative xmlns:adec="http://schemas.microsoft.com/office/drawing/2017/decorative" val="1"/>
-              </a:ext>
-            </a:extLst>
-          </p:cNvPr>
-          <p:cNvSpPr>
-            <a:spLocks noGrp="1" noRot="1" noChangeAspect="1" noMove="1" noResize="1" noEditPoints="1" noAdjustHandles="1" noChangeArrowheads="1" noChangeShapeType="1" noTextEdit="1"/>
-          </p:cNvSpPr>
-          <p:nvPr>
-            <p:extLst>
-              <p:ext uri="{386F3935-93C4-4BCD-93E2-E3B085C9AB24}">
-                <p16:designElem xmlns:p16="http://schemas.microsoft.com/office/powerpoint/2015/main" val="1"/>
-              </p:ext>
-            </p:extLst>
-          </p:nvPr>
-        </p:nvSpPr>
-        <p:spPr>
-          <a:xfrm>
-            <a:off x="0" y="1"/>
-            <a:ext cx="12192000" cy="6857999"/>
-          </a:xfrm>
-          <a:prstGeom prst="rect">
-            <a:avLst/>
-          </a:prstGeom>
-          <a:solidFill>
-            <a:schemeClr val="bg1">
-              <a:alpha val="20000"/>
-            </a:schemeClr>
-          </a:solidFill>
-          <a:ln>
-            <a:noFill/>
-          </a:ln>
-        </p:spPr>
-        <p:style>
-          <a:lnRef idx="2">
-            <a:schemeClr val="accent1">
-              <a:shade val="50000"/>
-            </a:schemeClr>
-          </a:lnRef>
-          <a:fillRef idx="1">
-            <a:schemeClr val="accent1"/>
-          </a:fillRef>
-          <a:effectRef idx="0">
-            <a:schemeClr val="accent1"/>
-          </a:effectRef>
-          <a:fontRef idx="minor">
-            <a:schemeClr val="lt1"/>
-          </a:fontRef>
-        </p:style>
-        <p:txBody>
-          <a:bodyPr rtlCol="0" anchor="ctr"/>
-          <a:lstStyle/>
-          <a:p>
-            <a:pPr algn="ctr"/>
-            <a:endParaRPr lang="en-US"/>
-          </a:p>
-        </p:txBody>
-      </p:sp>
-      <p:sp>
-        <p:nvSpPr>
-          <p:cNvPr id="12" name="Rectangle 11">
-            <a:extLst>
-              <a:ext uri="{FF2B5EF4-FFF2-40B4-BE49-F238E27FC236}">
-                <a16:creationId xmlns:a16="http://schemas.microsoft.com/office/drawing/2014/main" id="{49C44AFD-C72D-4D9C-84C6-73E615CED884}"/>
-              </a:ext>
-              <a:ext uri="{C183D7F6-B498-43B3-948B-1728B52AA6E4}">
-                <adec:decorative xmlns:adec="http://schemas.microsoft.com/office/drawing/2017/decorative" val="1"/>
-              </a:ext>
-            </a:extLst>
-          </p:cNvPr>
-          <p:cNvSpPr>
-            <a:spLocks noGrp="1" noRot="1" noChangeAspect="1" noMove="1" noResize="1" noEditPoints="1" noAdjustHandles="1" noChangeArrowheads="1" noChangeShapeType="1" noTextEdit="1"/>
-          </p:cNvSpPr>
-          <p:nvPr>
-            <p:extLst>
-              <p:ext uri="{386F3935-93C4-4BCD-93E2-E3B085C9AB24}">
-                <p16:designElem xmlns:p16="http://schemas.microsoft.com/office/powerpoint/2015/main" val="1"/>
-              </p:ext>
-            </p:extLst>
-          </p:nvPr>
-        </p:nvSpPr>
-        <p:spPr>
-          <a:xfrm>
-            <a:off x="1524" y="0"/>
-            <a:ext cx="12188952" cy="6858000"/>
-          </a:xfrm>
-          <a:prstGeom prst="rect">
-            <a:avLst/>
-          </a:prstGeom>
-          <a:blipFill dpi="0" rotWithShape="1">
-            <a:blip r:embed="rId3">
-              <a:alphaModFix amt="30000"/>
-              <a:duotone>
-                <a:prstClr val="black"/>
-                <a:schemeClr val="accent1">
-                  <a:tint val="45000"/>
-                  <a:satMod val="400000"/>
-                </a:schemeClr>
-              </a:duotone>
-              <a:extLst>
-                <a:ext uri="{BEBA8EAE-BF5A-486C-A8C5-ECC9F3942E4B}">
-                  <a14:imgProps xmlns:a14="http://schemas.microsoft.com/office/drawing/2010/main">
-                    <a14:imgLayer r:embed="rId4">
-                      <a14:imgEffect>
-                        <a14:sharpenSoften amount="61000"/>
-                      </a14:imgEffect>
-                      <a14:imgEffect>
-                        <a14:brightnessContrast bright="-25000" contrast="20000"/>
-                      </a14:imgEffect>
-                    </a14:imgLayer>
-                  </a14:imgProps>
-                </a:ext>
-                <a:ext uri="{28A0092B-C50C-407E-A947-70E740481C1C}">
-                  <a14:useLocalDpi xmlns:a14="http://schemas.microsoft.com/office/drawing/2010/main" val="0"/>
-                </a:ext>
-              </a:extLst>
-            </a:blip>
-            <a:srcRect/>
-            <a:tile tx="0" ty="-762000" sx="92000" sy="89000" flip="xy" algn="ctr"/>
-          </a:blipFill>
-          <a:ln>
-            <a:noFill/>
-          </a:ln>
-        </p:spPr>
-        <p:style>
-          <a:lnRef idx="2">
-            <a:schemeClr val="accent1">
-              <a:shade val="50000"/>
-            </a:schemeClr>
-          </a:lnRef>
-          <a:fillRef idx="1">
-            <a:schemeClr val="accent1"/>
-          </a:fillRef>
-          <a:effectRef idx="0">
-            <a:schemeClr val="accent1"/>
-          </a:effectRef>
-          <a:fontRef idx="minor">
-            <a:schemeClr val="lt1"/>
-          </a:fontRef>
-        </p:style>
-        <p:txBody>
-          <a:bodyPr rtlCol="0" anchor="ctr"/>
-          <a:lstStyle/>
-          <a:p>
-            <a:pPr algn="ctr"/>
-            <a:endParaRPr lang="en-US"/>
-          </a:p>
-        </p:txBody>
-      </p:sp>
-      <p:sp>
-        <p:nvSpPr>
-          <p:cNvPr id="2" name="Titel 1">
-            <a:extLst>
-              <a:ext uri="{FF2B5EF4-FFF2-40B4-BE49-F238E27FC236}">
-                <a16:creationId xmlns:a16="http://schemas.microsoft.com/office/drawing/2014/main" id="{B906A42B-E84E-4817-82A2-FB3047CABBFF}"/>
-              </a:ext>
-            </a:extLst>
-          </p:cNvPr>
-          <p:cNvSpPr>
-            <a:spLocks noGrp="1"/>
-          </p:cNvSpPr>
-          <p:nvPr>
-            <p:ph type="title"/>
-          </p:nvPr>
-        </p:nvSpPr>
-        <p:spPr>
-          <a:xfrm>
-            <a:off x="1069848" y="484632"/>
-            <a:ext cx="10058400" cy="1609344"/>
-          </a:xfrm>
-        </p:spPr>
-        <p:txBody>
-          <a:bodyPr anchor="ctr">
-            <a:normAutofit/>
-          </a:bodyPr>
-          <a:lstStyle/>
-          <a:p>
-            <a:r>
-              <a:rPr lang="nl-NL" dirty="0">
-                <a:solidFill>
-                  <a:schemeClr val="tx1"/>
-                </a:solidFill>
-              </a:rPr>
-              <a:t>Jesse programeerder</a:t>
-            </a:r>
-          </a:p>
-        </p:txBody>
-      </p:sp>
-      <p:sp>
-        <p:nvSpPr>
-          <p:cNvPr id="3" name="Tijdelijke aanduiding voor inhoud 2">
-            <a:extLst>
-              <a:ext uri="{FF2B5EF4-FFF2-40B4-BE49-F238E27FC236}">
-                <a16:creationId xmlns:a16="http://schemas.microsoft.com/office/drawing/2014/main" id="{61B1BBB0-545D-4C45-AA3E-EB1132704768}"/>
-              </a:ext>
-            </a:extLst>
-          </p:cNvPr>
-          <p:cNvSpPr>
-            <a:spLocks noGrp="1"/>
-          </p:cNvSpPr>
-          <p:nvPr>
-            <p:ph idx="1"/>
-          </p:nvPr>
-        </p:nvSpPr>
-        <p:spPr>
-          <a:xfrm>
-            <a:off x="1069848" y="2121408"/>
-            <a:ext cx="10058400" cy="3606292"/>
-          </a:xfrm>
-        </p:spPr>
-        <p:txBody>
-          <a:bodyPr>
-            <a:normAutofit/>
-          </a:bodyPr>
-          <a:lstStyle/>
-          <a:p>
-            <a:r>
-              <a:rPr lang="nl-NL" sz="2800" dirty="0">
-                <a:latin typeface="+mj-lt"/>
-              </a:rPr>
-              <a:t>Jesse is goed bezig met programmeren. Hij zorgt goed voor onze smell project en hij zorgt voor alle geluiden en voor technologie. Hij is de programmeur van de Raspberry</a:t>
-            </a:r>
-          </a:p>
-        </p:txBody>
-      </p:sp>
-      <p:grpSp>
-        <p:nvGrpSpPr>
-          <p:cNvPr id="14" name="Group 13">
-            <a:extLst>
-              <a:ext uri="{FF2B5EF4-FFF2-40B4-BE49-F238E27FC236}">
-                <a16:creationId xmlns:a16="http://schemas.microsoft.com/office/drawing/2014/main" id="{1D25B14F-36E0-41E8-956F-CABEF1ADD65F}"/>
-              </a:ext>
-              <a:ext uri="{C183D7F6-B498-43B3-948B-1728B52AA6E4}">
-                <adec:decorative xmlns:adec="http://schemas.microsoft.com/office/drawing/2017/decorative" val="1"/>
-              </a:ext>
-            </a:extLst>
-          </p:cNvPr>
-          <p:cNvGrpSpPr>
-            <a:grpSpLocks noGrp="1" noUngrp="1" noRot="1" noChangeAspect="1" noMove="1" noResize="1"/>
-          </p:cNvGrpSpPr>
-          <p:nvPr>
-            <p:extLst>
-              <p:ext uri="{386F3935-93C4-4BCD-93E2-E3B085C9AB24}">
-                <p16:designElem xmlns:p16="http://schemas.microsoft.com/office/powerpoint/2015/main" val="1"/>
-              </p:ext>
-            </p:extLst>
-          </p:nvPr>
-        </p:nvGrpSpPr>
-        <p:grpSpPr>
-          <a:xfrm>
-            <a:off x="11401725" y="6229681"/>
-            <a:ext cx="457200" cy="457200"/>
-            <a:chOff x="11361456" y="6195813"/>
-            <a:chExt cx="548640" cy="548640"/>
-          </a:xfrm>
-        </p:grpSpPr>
-        <p:sp>
-          <p:nvSpPr>
-            <p:cNvPr id="15" name="Oval 14">
-              <a:extLst>
-                <a:ext uri="{FF2B5EF4-FFF2-40B4-BE49-F238E27FC236}">
-                  <a16:creationId xmlns:a16="http://schemas.microsoft.com/office/drawing/2014/main" id="{4AFB9EA5-DE4D-4E6B-A302-F55174E4B19A}"/>
-                </a:ext>
-                <a:ext uri="{C183D7F6-B498-43B3-948B-1728B52AA6E4}">
-                  <adec:decorative xmlns:adec="http://schemas.microsoft.com/office/drawing/2017/decorative" val="1"/>
-                </a:ext>
-              </a:extLst>
-            </p:cNvPr>
-            <p:cNvSpPr/>
-            <p:nvPr>
-              <p:extLst>
-                <p:ext uri="{386F3935-93C4-4BCD-93E2-E3B085C9AB24}">
-                  <p16:designElem xmlns:p16="http://schemas.microsoft.com/office/powerpoint/2015/main" val="1"/>
-                </p:ext>
-              </p:extLst>
-            </p:nvPr>
-          </p:nvSpPr>
-          <p:spPr>
-            <a:xfrm>
-              <a:off x="11361456" y="6195813"/>
-              <a:ext cx="548640" cy="548640"/>
-            </a:xfrm>
-            <a:prstGeom prst="ellipse">
-              <a:avLst/>
-            </a:prstGeom>
-            <a:blipFill dpi="0" rotWithShape="1">
-              <a:blip r:embed="rId5">
-                <a:duotone>
-                  <a:schemeClr val="accent1">
-                    <a:shade val="45000"/>
-                    <a:satMod val="135000"/>
-                  </a:schemeClr>
-                  <a:prstClr val="white"/>
-                </a:duotone>
-                <a:extLst/>
-              </a:blip>
-              <a:srcRect/>
-              <a:tile tx="50800" ty="0" sx="85000" sy="85000" flip="none" algn="tl"/>
-            </a:blipFill>
-            <a:ln w="25400" cap="flat" cmpd="sng" algn="ctr">
-              <a:noFill/>
-              <a:prstDash val="solid"/>
-            </a:ln>
-            <a:effectLst/>
-          </p:spPr>
-          <p:txBody>
-            <a:bodyPr lIns="0" tIns="0" rIns="0" bIns="0" rtlCol="0" anchor="ctr"/>
-            <a:lstStyle/>
-            <a:p>
-              <a:pPr marL="0" marR="0" lvl="0" indent="0" algn="ctr" defTabSz="914400" eaLnBrk="1" fontAlgn="auto" latinLnBrk="0" hangingPunct="1">
-                <a:lnSpc>
-                  <a:spcPct val="100000"/>
-                </a:lnSpc>
-                <a:spcBef>
-                  <a:spcPts val="0"/>
-                </a:spcBef>
-                <a:spcAft>
-                  <a:spcPts val="0"/>
-                </a:spcAft>
-                <a:buClrTx/>
-                <a:buSzTx/>
-                <a:buFontTx/>
-                <a:buNone/>
-                <a:tabLst/>
-                <a:defRPr/>
-              </a:pPr>
-              <a:endParaRPr kumimoji="0" lang="en-US" sz="2000" b="0" i="0" u="none" strike="noStrike" kern="0" cap="none" spc="0" normalizeH="0" baseline="0" noProof="0" dirty="0">
-                <a:ln>
-                  <a:noFill/>
-                </a:ln>
-                <a:solidFill>
-                  <a:prstClr val="white"/>
-                </a:solidFill>
-                <a:effectLst/>
-                <a:uLnTx/>
-                <a:uFillTx/>
-                <a:latin typeface="Rockwell Extra Bold" pitchFamily="18" charset="0"/>
-                <a:ea typeface="+mn-ea"/>
-                <a:cs typeface="+mn-cs"/>
-              </a:endParaRPr>
-            </a:p>
-          </p:txBody>
-        </p:sp>
-        <p:sp>
-          <p:nvSpPr>
-            <p:cNvPr id="16" name="Oval 15">
-              <a:extLst>
-                <a:ext uri="{FF2B5EF4-FFF2-40B4-BE49-F238E27FC236}">
-                  <a16:creationId xmlns:a16="http://schemas.microsoft.com/office/drawing/2014/main" id="{E44092F4-4D9B-4D0A-8832-C29E786F8F03}"/>
-                </a:ext>
-                <a:ext uri="{C183D7F6-B498-43B3-948B-1728B52AA6E4}">
-                  <adec:decorative xmlns:adec="http://schemas.microsoft.com/office/drawing/2017/decorative" val="1"/>
-                </a:ext>
-              </a:extLst>
-            </p:cNvPr>
-            <p:cNvSpPr/>
-            <p:nvPr>
-              <p:extLst>
-                <p:ext uri="{386F3935-93C4-4BCD-93E2-E3B085C9AB24}">
-                  <p16:designElem xmlns:p16="http://schemas.microsoft.com/office/powerpoint/2015/main" val="1"/>
-                </p:ext>
-              </p:extLst>
-            </p:nvPr>
-          </p:nvSpPr>
-          <p:spPr>
-            <a:xfrm>
-              <a:off x="11396488" y="6230844"/>
-              <a:ext cx="478576" cy="478578"/>
-            </a:xfrm>
-            <a:prstGeom prst="ellipse">
-              <a:avLst/>
-            </a:prstGeom>
-            <a:noFill/>
-            <a:ln w="12700" cap="flat" cmpd="sng" algn="ctr">
-              <a:solidFill>
-                <a:srgbClr val="FFFFFF"/>
-              </a:solidFill>
-              <a:prstDash val="solid"/>
-            </a:ln>
-            <a:effectLst/>
-          </p:spPr>
-          <p:txBody>
-            <a:bodyPr rtlCol="0" anchor="ctr"/>
-            <a:lstStyle/>
-            <a:p>
-              <a:pPr marL="0" marR="0" lvl="0" indent="0" algn="ctr" defTabSz="914400" eaLnBrk="1" fontAlgn="auto" latinLnBrk="0" hangingPunct="1">
-                <a:lnSpc>
-                  <a:spcPct val="100000"/>
-                </a:lnSpc>
-                <a:spcBef>
-                  <a:spcPts val="0"/>
-                </a:spcBef>
-                <a:spcAft>
-                  <a:spcPts val="0"/>
-                </a:spcAft>
-                <a:buClrTx/>
-                <a:buSzTx/>
-                <a:buFontTx/>
-                <a:buNone/>
-                <a:tabLst/>
-                <a:defRPr/>
-              </a:pPr>
-              <a:endParaRPr kumimoji="0" lang="en-US" sz="1800" b="0" i="0" u="none" strike="noStrike" kern="0" cap="none" spc="0" normalizeH="0" baseline="0" noProof="0" dirty="0">
-                <a:ln>
-                  <a:noFill/>
-                </a:ln>
-                <a:solidFill>
-                  <a:prstClr val="white"/>
-                </a:solidFill>
-                <a:effectLst/>
-                <a:uLnTx/>
-                <a:uFillTx/>
-                <a:latin typeface="Calibri"/>
-                <a:ea typeface="+mn-ea"/>
-                <a:cs typeface="+mn-cs"/>
-              </a:endParaRPr>
-            </a:p>
-          </p:txBody>
-        </p:sp>
-      </p:grpSp>
     </p:spTree>
     <p:extLst>
       <p:ext uri="{BB962C8B-B14F-4D97-AF65-F5344CB8AC3E}">
-        <p14:creationId xmlns:p14="http://schemas.microsoft.com/office/powerpoint/2010/main" val="2917112675"/>
+        <p14:creationId xmlns:p14="http://schemas.microsoft.com/office/powerpoint/2010/main" val="806397026"/>
       </p:ext>
     </p:extLst>
   </p:cSld>
   <p:clrMapOvr>
-    <a:overrideClrMapping bg1="dk1" tx1="lt1" bg2="dk2" tx2="lt2" accent1="accent1" accent2="accent2" accent3="accent3" accent4="accent4" accent5="accent5" accent6="accent6" hlink="hlink" folHlink="folHlink"/>
+    <a:masterClrMapping/>
   </p:clrMapOvr>
 </p:sld>
 </file>
@@ -5500,7 +4904,7 @@
     <p:bg>
       <p:bgPr>
         <a:solidFill>
-          <a:schemeClr val="bg1"/>
+          <a:srgbClr val="00CDFF"/>
         </a:solidFill>
         <a:effectLst/>
       </p:bgPr>
@@ -5519,12 +4923,169 @@
           <a:chExt cx="0" cy="0"/>
         </a:xfrm>
       </p:grpSpPr>
+      <p:sp>
+        <p:nvSpPr>
+          <p:cNvPr id="2" name="Titel 1">
+            <a:extLst>
+              <a:ext uri="{FF2B5EF4-FFF2-40B4-BE49-F238E27FC236}">
+                <a16:creationId xmlns:a16="http://schemas.microsoft.com/office/drawing/2014/main" id="{B906A42B-E84E-4817-82A2-FB3047CABBFF}"/>
+              </a:ext>
+            </a:extLst>
+          </p:cNvPr>
+          <p:cNvSpPr>
+            <a:spLocks noGrp="1"/>
+          </p:cNvSpPr>
+          <p:nvPr>
+            <p:ph type="title"/>
+          </p:nvPr>
+        </p:nvSpPr>
+        <p:spPr>
+          <a:xfrm>
+            <a:off x="1069848" y="484632"/>
+            <a:ext cx="10058400" cy="1609344"/>
+          </a:xfrm>
+        </p:spPr>
+        <p:txBody>
+          <a:bodyPr anchor="ctr">
+            <a:normAutofit/>
+          </a:bodyPr>
+          <a:lstStyle/>
+          <a:p>
+            <a:r>
+              <a:rPr lang="nl-NL" dirty="0">
+                <a:solidFill>
+                  <a:schemeClr val="tx1"/>
+                </a:solidFill>
+              </a:rPr>
+              <a:t>Voor wie is de </a:t>
+            </a:r>
+            <a:r>
+              <a:rPr lang="nl-NL" dirty="0" err="1">
+                <a:solidFill>
+                  <a:schemeClr val="tx1"/>
+                </a:solidFill>
+              </a:rPr>
+              <a:t>smell</a:t>
+            </a:r>
+            <a:r>
+              <a:rPr lang="nl-NL" dirty="0">
+                <a:solidFill>
+                  <a:schemeClr val="tx1"/>
+                </a:solidFill>
+              </a:rPr>
+              <a:t> </a:t>
+            </a:r>
+            <a:r>
+              <a:rPr lang="nl-NL" dirty="0" err="1">
+                <a:solidFill>
+                  <a:schemeClr val="tx1"/>
+                </a:solidFill>
+              </a:rPr>
+              <a:t>cube</a:t>
+            </a:r>
+            <a:r>
+              <a:rPr lang="nl-NL" dirty="0">
+                <a:solidFill>
+                  <a:schemeClr val="tx1"/>
+                </a:solidFill>
+              </a:rPr>
+              <a:t> gemaakt</a:t>
+            </a:r>
+          </a:p>
+        </p:txBody>
+      </p:sp>
+      <p:sp>
+        <p:nvSpPr>
+          <p:cNvPr id="3" name="Tijdelijke aanduiding voor inhoud 2">
+            <a:extLst>
+              <a:ext uri="{FF2B5EF4-FFF2-40B4-BE49-F238E27FC236}">
+                <a16:creationId xmlns:a16="http://schemas.microsoft.com/office/drawing/2014/main" id="{61B1BBB0-545D-4C45-AA3E-EB1132704768}"/>
+              </a:ext>
+            </a:extLst>
+          </p:cNvPr>
+          <p:cNvSpPr>
+            <a:spLocks noGrp="1"/>
+          </p:cNvSpPr>
+          <p:nvPr>
+            <p:ph idx="1"/>
+          </p:nvPr>
+        </p:nvSpPr>
+        <p:spPr>
+          <a:xfrm>
+            <a:off x="1069848" y="2121408"/>
+            <a:ext cx="10058400" cy="3457007"/>
+          </a:xfrm>
+        </p:spPr>
+        <p:txBody>
+          <a:bodyPr>
+            <a:normAutofit/>
+          </a:bodyPr>
+          <a:lstStyle/>
+          <a:p>
+            <a:r>
+              <a:rPr lang="nl-NL" sz="2800" dirty="0">
+                <a:latin typeface="+mj-lt"/>
+              </a:rPr>
+              <a:t>Mensen die niet (goed) kunnen ruiken</a:t>
+            </a:r>
+          </a:p>
+          <a:p>
+            <a:pPr marL="0" indent="0">
+              <a:buNone/>
+            </a:pPr>
+            <a:r>
+              <a:rPr lang="nl-NL" sz="2800" dirty="0">
+                <a:latin typeface="+mj-lt"/>
+              </a:rPr>
+              <a:t>	aangeboren, verkouden</a:t>
+            </a:r>
+          </a:p>
+          <a:p>
+            <a:r>
+              <a:rPr lang="nl-NL" sz="2800" dirty="0">
+                <a:latin typeface="+mj-lt"/>
+              </a:rPr>
+              <a:t>Als je hem op een speciale plek nodig hebt</a:t>
+            </a:r>
+          </a:p>
+          <a:p>
+            <a:pPr marL="0" indent="0">
+              <a:buNone/>
+            </a:pPr>
+            <a:r>
+              <a:rPr lang="nl-NL" sz="2800" dirty="0">
+                <a:latin typeface="+mj-lt"/>
+              </a:rPr>
+              <a:t>	in de garage, bij de oven, baby luier</a:t>
+            </a:r>
+          </a:p>
+          <a:p>
+            <a:r>
+              <a:rPr lang="nl-NL" sz="2800" dirty="0">
+                <a:latin typeface="+mj-lt"/>
+              </a:rPr>
+              <a:t>Voor momenten als je er zelf niet bij kunt zijn</a:t>
+            </a:r>
+          </a:p>
+          <a:p>
+            <a:pPr marL="0" indent="0">
+              <a:buNone/>
+            </a:pPr>
+            <a:r>
+              <a:rPr lang="nl-NL" sz="2800" dirty="0">
+                <a:latin typeface="+mj-lt"/>
+              </a:rPr>
+              <a:t>	‘s nachts, ziek op bed, in de stal</a:t>
+            </a:r>
+          </a:p>
+        </p:txBody>
+      </p:sp>
       <p:pic>
         <p:nvPicPr>
-          <p:cNvPr id="5" name="Afbeelding 4">
+          <p:cNvPr id="8" name="Afbeelding 7">
             <a:extLst>
               <a:ext uri="{FF2B5EF4-FFF2-40B4-BE49-F238E27FC236}">
-                <a16:creationId xmlns:a16="http://schemas.microsoft.com/office/drawing/2014/main" id="{1B876FF6-FC6A-46AD-B324-11E05C0095DF}"/>
+                <a16:creationId xmlns:a16="http://schemas.microsoft.com/office/drawing/2014/main" id="{EE687FAD-2A64-4CE3-B19F-D3AE324D2A22}"/>
               </a:ext>
             </a:extLst>
           </p:cNvPr>
@@ -5533,593 +5094,56 @@
           </p:cNvPicPr>
           <p:nvPr/>
         </p:nvPicPr>
-        <p:blipFill rotWithShape="1">
+        <p:blipFill>
           <a:blip r:embed="rId2"/>
-          <a:srcRect b="443"/>
-          <a:stretch/>
+          <a:stretch>
+            <a:fillRect/>
+          </a:stretch>
         </p:blipFill>
         <p:spPr>
           <a:xfrm>
-            <a:off x="20" y="10"/>
-            <a:ext cx="12191980" cy="6857989"/>
+            <a:off x="7634640" y="1768900"/>
+            <a:ext cx="2705120" cy="4667284"/>
           </a:xfrm>
           <a:prstGeom prst="rect">
             <a:avLst/>
           </a:prstGeom>
         </p:spPr>
       </p:pic>
-      <p:sp>
-        <p:nvSpPr>
-          <p:cNvPr id="10" name="Rectangle 9">
+      <p:pic>
+        <p:nvPicPr>
+          <p:cNvPr id="6" name="Afbeelding 5">
             <a:extLst>
               <a:ext uri="{FF2B5EF4-FFF2-40B4-BE49-F238E27FC236}">
-                <a16:creationId xmlns:a16="http://schemas.microsoft.com/office/drawing/2014/main" id="{F79FF99C-BAA9-404F-9C96-6DD456B4F795}"/>
-              </a:ext>
-              <a:ext uri="{C183D7F6-B498-43B3-948B-1728B52AA6E4}">
-                <adec:decorative xmlns:adec="http://schemas.microsoft.com/office/drawing/2017/decorative" val="1"/>
+                <a16:creationId xmlns:a16="http://schemas.microsoft.com/office/drawing/2014/main" id="{61B5D94B-DDC6-494F-9838-426D3BD20B80}"/>
               </a:ext>
             </a:extLst>
           </p:cNvPr>
-          <p:cNvSpPr>
-            <a:spLocks noGrp="1" noRot="1" noChangeAspect="1" noMove="1" noResize="1" noEditPoints="1" noAdjustHandles="1" noChangeArrowheads="1" noChangeShapeType="1" noTextEdit="1"/>
-          </p:cNvSpPr>
-          <p:nvPr>
-            <p:extLst>
-              <p:ext uri="{386F3935-93C4-4BCD-93E2-E3B085C9AB24}">
-                <p16:designElem xmlns:p16="http://schemas.microsoft.com/office/powerpoint/2015/main" val="1"/>
-              </p:ext>
-            </p:extLst>
-          </p:nvPr>
-        </p:nvSpPr>
+          <p:cNvPicPr>
+            <a:picLocks noChangeAspect="1"/>
+          </p:cNvPicPr>
+          <p:nvPr/>
+        </p:nvPicPr>
+        <p:blipFill>
+          <a:blip r:embed="rId3"/>
+          <a:stretch>
+            <a:fillRect/>
+          </a:stretch>
+        </p:blipFill>
         <p:spPr>
           <a:xfrm>
-            <a:off x="0" y="1"/>
-            <a:ext cx="12192000" cy="6857999"/>
+            <a:off x="9412272" y="2757824"/>
+            <a:ext cx="1854976" cy="1609344"/>
           </a:xfrm>
           <a:prstGeom prst="rect">
             <a:avLst/>
           </a:prstGeom>
-          <a:solidFill>
-            <a:schemeClr val="bg1">
-              <a:alpha val="20000"/>
-            </a:schemeClr>
-          </a:solidFill>
-          <a:ln>
-            <a:noFill/>
-          </a:ln>
         </p:spPr>
-        <p:style>
-          <a:lnRef idx="2">
-            <a:schemeClr val="accent1">
-              <a:shade val="50000"/>
-            </a:schemeClr>
-          </a:lnRef>
-          <a:fillRef idx="1">
-            <a:schemeClr val="accent1"/>
-          </a:fillRef>
-          <a:effectRef idx="0">
-            <a:schemeClr val="accent1"/>
-          </a:effectRef>
-          <a:fontRef idx="minor">
-            <a:schemeClr val="lt1"/>
-          </a:fontRef>
-        </p:style>
-        <p:txBody>
-          <a:bodyPr rtlCol="0" anchor="ctr"/>
-          <a:lstStyle/>
-          <a:p>
-            <a:pPr algn="ctr"/>
-            <a:endParaRPr lang="en-US"/>
-          </a:p>
-        </p:txBody>
-      </p:sp>
-      <p:sp>
-        <p:nvSpPr>
-          <p:cNvPr id="12" name="Rectangle 11">
-            <a:extLst>
-              <a:ext uri="{FF2B5EF4-FFF2-40B4-BE49-F238E27FC236}">
-                <a16:creationId xmlns:a16="http://schemas.microsoft.com/office/drawing/2014/main" id="{49C44AFD-C72D-4D9C-84C6-73E615CED884}"/>
-              </a:ext>
-              <a:ext uri="{C183D7F6-B498-43B3-948B-1728B52AA6E4}">
-                <adec:decorative xmlns:adec="http://schemas.microsoft.com/office/drawing/2017/decorative" val="1"/>
-              </a:ext>
-            </a:extLst>
-          </p:cNvPr>
-          <p:cNvSpPr>
-            <a:spLocks noGrp="1" noRot="1" noChangeAspect="1" noMove="1" noResize="1" noEditPoints="1" noAdjustHandles="1" noChangeArrowheads="1" noChangeShapeType="1" noTextEdit="1"/>
-          </p:cNvSpPr>
-          <p:nvPr>
-            <p:extLst>
-              <p:ext uri="{386F3935-93C4-4BCD-93E2-E3B085C9AB24}">
-                <p16:designElem xmlns:p16="http://schemas.microsoft.com/office/powerpoint/2015/main" val="1"/>
-              </p:ext>
-            </p:extLst>
-          </p:nvPr>
-        </p:nvSpPr>
-        <p:spPr>
-          <a:xfrm>
-            <a:off x="1524" y="0"/>
-            <a:ext cx="12188952" cy="6858000"/>
-          </a:xfrm>
-          <a:prstGeom prst="rect">
-            <a:avLst/>
-          </a:prstGeom>
-          <a:blipFill dpi="0" rotWithShape="1">
-            <a:blip r:embed="rId3">
-              <a:alphaModFix amt="30000"/>
-              <a:duotone>
-                <a:prstClr val="black"/>
-                <a:schemeClr val="accent1">
-                  <a:tint val="45000"/>
-                  <a:satMod val="400000"/>
-                </a:schemeClr>
-              </a:duotone>
-              <a:extLst>
-                <a:ext uri="{BEBA8EAE-BF5A-486C-A8C5-ECC9F3942E4B}">
-                  <a14:imgProps xmlns:a14="http://schemas.microsoft.com/office/drawing/2010/main">
-                    <a14:imgLayer r:embed="rId4">
-                      <a14:imgEffect>
-                        <a14:sharpenSoften amount="61000"/>
-                      </a14:imgEffect>
-                      <a14:imgEffect>
-                        <a14:brightnessContrast bright="-25000" contrast="20000"/>
-                      </a14:imgEffect>
-                    </a14:imgLayer>
-                  </a14:imgProps>
-                </a:ext>
-                <a:ext uri="{28A0092B-C50C-407E-A947-70E740481C1C}">
-                  <a14:useLocalDpi xmlns:a14="http://schemas.microsoft.com/office/drawing/2010/main" val="0"/>
-                </a:ext>
-              </a:extLst>
-            </a:blip>
-            <a:srcRect/>
-            <a:tile tx="0" ty="-762000" sx="92000" sy="89000" flip="xy" algn="ctr"/>
-          </a:blipFill>
-          <a:ln>
-            <a:noFill/>
-          </a:ln>
-        </p:spPr>
-        <p:style>
-          <a:lnRef idx="2">
-            <a:schemeClr val="accent1">
-              <a:shade val="50000"/>
-            </a:schemeClr>
-          </a:lnRef>
-          <a:fillRef idx="1">
-            <a:schemeClr val="accent1"/>
-          </a:fillRef>
-          <a:effectRef idx="0">
-            <a:schemeClr val="accent1"/>
-          </a:effectRef>
-          <a:fontRef idx="minor">
-            <a:schemeClr val="lt1"/>
-          </a:fontRef>
-        </p:style>
-        <p:txBody>
-          <a:bodyPr rtlCol="0" anchor="ctr"/>
-          <a:lstStyle/>
-          <a:p>
-            <a:pPr algn="ctr"/>
-            <a:endParaRPr lang="en-US"/>
-          </a:p>
-        </p:txBody>
-      </p:sp>
-      <p:sp>
-        <p:nvSpPr>
-          <p:cNvPr id="2" name="Titel 1">
-            <a:extLst>
-              <a:ext uri="{FF2B5EF4-FFF2-40B4-BE49-F238E27FC236}">
-                <a16:creationId xmlns:a16="http://schemas.microsoft.com/office/drawing/2014/main" id="{919E1AC5-285B-490A-AC55-0CABABDD8B85}"/>
-              </a:ext>
-            </a:extLst>
-          </p:cNvPr>
-          <p:cNvSpPr>
-            <a:spLocks noGrp="1"/>
-          </p:cNvSpPr>
-          <p:nvPr>
-            <p:ph type="title"/>
-          </p:nvPr>
-        </p:nvSpPr>
-        <p:spPr>
-          <a:xfrm>
-            <a:off x="1069848" y="484632"/>
-            <a:ext cx="10058400" cy="1609344"/>
-          </a:xfrm>
-        </p:spPr>
-        <p:txBody>
-          <a:bodyPr anchor="ctr">
-            <a:normAutofit/>
-          </a:bodyPr>
-          <a:lstStyle/>
-          <a:p>
-            <a:r>
-              <a:rPr lang="nl-NL" sz="4600">
-                <a:solidFill>
-                  <a:schemeClr val="tx1"/>
-                </a:solidFill>
-              </a:rPr>
-              <a:t>Ekrem en Ömer ontwerper  (Jesse back-up)</a:t>
-            </a:r>
-            <a:br>
-              <a:rPr lang="nl-NL" sz="4600">
-                <a:solidFill>
-                  <a:schemeClr val="tx1"/>
-                </a:solidFill>
-              </a:rPr>
-            </a:br>
-            <a:endParaRPr lang="nl-NL" sz="4600">
-              <a:solidFill>
-                <a:schemeClr val="tx1"/>
-              </a:solidFill>
-            </a:endParaRPr>
-          </a:p>
-        </p:txBody>
-      </p:sp>
-      <p:sp>
-        <p:nvSpPr>
-          <p:cNvPr id="3" name="Tijdelijke aanduiding voor inhoud 2">
-            <a:extLst>
-              <a:ext uri="{FF2B5EF4-FFF2-40B4-BE49-F238E27FC236}">
-                <a16:creationId xmlns:a16="http://schemas.microsoft.com/office/drawing/2014/main" id="{E2DE8640-3EF0-4725-9CB5-836E4E2DB7B0}"/>
-              </a:ext>
-            </a:extLst>
-          </p:cNvPr>
-          <p:cNvSpPr>
-            <a:spLocks noGrp="1"/>
-          </p:cNvSpPr>
-          <p:nvPr>
-            <p:ph idx="1"/>
-          </p:nvPr>
-        </p:nvSpPr>
-        <p:spPr>
-          <a:xfrm>
-            <a:off x="1069848" y="2121408"/>
-            <a:ext cx="10058400" cy="4050792"/>
-          </a:xfrm>
-        </p:spPr>
-        <p:txBody>
-          <a:bodyPr>
-            <a:normAutofit/>
-          </a:bodyPr>
-          <a:lstStyle/>
-          <a:p>
-            <a:r>
-              <a:rPr lang="nl-NL" sz="2800" dirty="0">
-                <a:latin typeface="+mj-lt"/>
-              </a:rPr>
-              <a:t>Ekrem en Ömer waren de ontwerpers van de smell cube. </a:t>
-            </a:r>
-          </a:p>
-          <a:p>
-            <a:r>
-              <a:rPr lang="nl-NL" sz="2800" dirty="0">
-                <a:latin typeface="+mj-lt"/>
-              </a:rPr>
-              <a:t>Ze hebben allebei gewerkt op de laptop met sketchupp. Sketchupp is een teken programma op de computer, hiermee hebben ze het Raspberry doosje en de smell cube ontworpen en ook nog de draden en sensoren in elkaar gezet</a:t>
-            </a:r>
-          </a:p>
-        </p:txBody>
-      </p:sp>
-      <p:grpSp>
-        <p:nvGrpSpPr>
-          <p:cNvPr id="14" name="Group 13">
-            <a:extLst>
-              <a:ext uri="{FF2B5EF4-FFF2-40B4-BE49-F238E27FC236}">
-                <a16:creationId xmlns:a16="http://schemas.microsoft.com/office/drawing/2014/main" id="{1D25B14F-36E0-41E8-956F-CABEF1ADD65F}"/>
-              </a:ext>
-              <a:ext uri="{C183D7F6-B498-43B3-948B-1728B52AA6E4}">
-                <adec:decorative xmlns:adec="http://schemas.microsoft.com/office/drawing/2017/decorative" val="1"/>
-              </a:ext>
-            </a:extLst>
-          </p:cNvPr>
-          <p:cNvGrpSpPr>
-            <a:grpSpLocks noGrp="1" noUngrp="1" noRot="1" noChangeAspect="1" noMove="1" noResize="1"/>
-          </p:cNvGrpSpPr>
-          <p:nvPr>
-            <p:extLst>
-              <p:ext uri="{386F3935-93C4-4BCD-93E2-E3B085C9AB24}">
-                <p16:designElem xmlns:p16="http://schemas.microsoft.com/office/powerpoint/2015/main" val="1"/>
-              </p:ext>
-            </p:extLst>
-          </p:nvPr>
-        </p:nvGrpSpPr>
-        <p:grpSpPr>
-          <a:xfrm>
-            <a:off x="11401725" y="6229681"/>
-            <a:ext cx="457200" cy="457200"/>
-            <a:chOff x="11361456" y="6195813"/>
-            <a:chExt cx="548640" cy="548640"/>
-          </a:xfrm>
-        </p:grpSpPr>
-        <p:sp>
-          <p:nvSpPr>
-            <p:cNvPr id="15" name="Oval 14">
-              <a:extLst>
-                <a:ext uri="{FF2B5EF4-FFF2-40B4-BE49-F238E27FC236}">
-                  <a16:creationId xmlns:a16="http://schemas.microsoft.com/office/drawing/2014/main" id="{4AFB9EA5-DE4D-4E6B-A302-F55174E4B19A}"/>
-                </a:ext>
-                <a:ext uri="{C183D7F6-B498-43B3-948B-1728B52AA6E4}">
-                  <adec:decorative xmlns:adec="http://schemas.microsoft.com/office/drawing/2017/decorative" val="1"/>
-                </a:ext>
-              </a:extLst>
-            </p:cNvPr>
-            <p:cNvSpPr/>
-            <p:nvPr>
-              <p:extLst>
-                <p:ext uri="{386F3935-93C4-4BCD-93E2-E3B085C9AB24}">
-                  <p16:designElem xmlns:p16="http://schemas.microsoft.com/office/powerpoint/2015/main" val="1"/>
-                </p:ext>
-              </p:extLst>
-            </p:nvPr>
-          </p:nvSpPr>
-          <p:spPr>
-            <a:xfrm>
-              <a:off x="11361456" y="6195813"/>
-              <a:ext cx="548640" cy="548640"/>
-            </a:xfrm>
-            <a:prstGeom prst="ellipse">
-              <a:avLst/>
-            </a:prstGeom>
-            <a:blipFill dpi="0" rotWithShape="1">
-              <a:blip r:embed="rId5">
-                <a:duotone>
-                  <a:schemeClr val="accent1">
-                    <a:shade val="45000"/>
-                    <a:satMod val="135000"/>
-                  </a:schemeClr>
-                  <a:prstClr val="white"/>
-                </a:duotone>
-                <a:extLst/>
-              </a:blip>
-              <a:srcRect/>
-              <a:tile tx="50800" ty="0" sx="85000" sy="85000" flip="none" algn="tl"/>
-            </a:blipFill>
-            <a:ln w="25400" cap="flat" cmpd="sng" algn="ctr">
-              <a:noFill/>
-              <a:prstDash val="solid"/>
-            </a:ln>
-            <a:effectLst/>
-          </p:spPr>
-          <p:txBody>
-            <a:bodyPr lIns="0" tIns="0" rIns="0" bIns="0" rtlCol="0" anchor="ctr"/>
-            <a:lstStyle/>
-            <a:p>
-              <a:pPr marL="0" marR="0" lvl="0" indent="0" algn="ctr" defTabSz="914400" eaLnBrk="1" fontAlgn="auto" latinLnBrk="0" hangingPunct="1">
-                <a:lnSpc>
-                  <a:spcPct val="100000"/>
-                </a:lnSpc>
-                <a:spcBef>
-                  <a:spcPts val="0"/>
-                </a:spcBef>
-                <a:spcAft>
-                  <a:spcPts val="0"/>
-                </a:spcAft>
-                <a:buClrTx/>
-                <a:buSzTx/>
-                <a:buFontTx/>
-                <a:buNone/>
-                <a:tabLst/>
-                <a:defRPr/>
-              </a:pPr>
-              <a:endParaRPr kumimoji="0" lang="en-US" sz="2000" b="0" i="0" u="none" strike="noStrike" kern="0" cap="none" spc="0" normalizeH="0" baseline="0" noProof="0" dirty="0">
-                <a:ln>
-                  <a:noFill/>
-                </a:ln>
-                <a:solidFill>
-                  <a:prstClr val="white"/>
-                </a:solidFill>
-                <a:effectLst/>
-                <a:uLnTx/>
-                <a:uFillTx/>
-                <a:latin typeface="Rockwell Extra Bold" pitchFamily="18" charset="0"/>
-                <a:ea typeface="+mn-ea"/>
-                <a:cs typeface="+mn-cs"/>
-              </a:endParaRPr>
-            </a:p>
-          </p:txBody>
-        </p:sp>
-        <p:sp>
-          <p:nvSpPr>
-            <p:cNvPr id="16" name="Oval 15">
-              <a:extLst>
-                <a:ext uri="{FF2B5EF4-FFF2-40B4-BE49-F238E27FC236}">
-                  <a16:creationId xmlns:a16="http://schemas.microsoft.com/office/drawing/2014/main" id="{E44092F4-4D9B-4D0A-8832-C29E786F8F03}"/>
-                </a:ext>
-                <a:ext uri="{C183D7F6-B498-43B3-948B-1728B52AA6E4}">
-                  <adec:decorative xmlns:adec="http://schemas.microsoft.com/office/drawing/2017/decorative" val="1"/>
-                </a:ext>
-              </a:extLst>
-            </p:cNvPr>
-            <p:cNvSpPr/>
-            <p:nvPr>
-              <p:extLst>
-                <p:ext uri="{386F3935-93C4-4BCD-93E2-E3B085C9AB24}">
-                  <p16:designElem xmlns:p16="http://schemas.microsoft.com/office/powerpoint/2015/main" val="1"/>
-                </p:ext>
-              </p:extLst>
-            </p:nvPr>
-          </p:nvSpPr>
-          <p:spPr>
-            <a:xfrm>
-              <a:off x="11396488" y="6230844"/>
-              <a:ext cx="478576" cy="478578"/>
-            </a:xfrm>
-            <a:prstGeom prst="ellipse">
-              <a:avLst/>
-            </a:prstGeom>
-            <a:noFill/>
-            <a:ln w="12700" cap="flat" cmpd="sng" algn="ctr">
-              <a:solidFill>
-                <a:srgbClr val="FFFFFF"/>
-              </a:solidFill>
-              <a:prstDash val="solid"/>
-            </a:ln>
-            <a:effectLst/>
-          </p:spPr>
-          <p:txBody>
-            <a:bodyPr rtlCol="0" anchor="ctr"/>
-            <a:lstStyle/>
-            <a:p>
-              <a:pPr marL="0" marR="0" lvl="0" indent="0" algn="ctr" defTabSz="914400" eaLnBrk="1" fontAlgn="auto" latinLnBrk="0" hangingPunct="1">
-                <a:lnSpc>
-                  <a:spcPct val="100000"/>
-                </a:lnSpc>
-                <a:spcBef>
-                  <a:spcPts val="0"/>
-                </a:spcBef>
-                <a:spcAft>
-                  <a:spcPts val="0"/>
-                </a:spcAft>
-                <a:buClrTx/>
-                <a:buSzTx/>
-                <a:buFontTx/>
-                <a:buNone/>
-                <a:tabLst/>
-                <a:defRPr/>
-              </a:pPr>
-              <a:endParaRPr kumimoji="0" lang="en-US" sz="1800" b="0" i="0" u="none" strike="noStrike" kern="0" cap="none" spc="0" normalizeH="0" baseline="0" noProof="0" dirty="0">
-                <a:ln>
-                  <a:noFill/>
-                </a:ln>
-                <a:solidFill>
-                  <a:prstClr val="white"/>
-                </a:solidFill>
-                <a:effectLst/>
-                <a:uLnTx/>
-                <a:uFillTx/>
-                <a:latin typeface="Calibri"/>
-                <a:ea typeface="+mn-ea"/>
-                <a:cs typeface="+mn-cs"/>
-              </a:endParaRPr>
-            </a:p>
-          </p:txBody>
-        </p:sp>
-      </p:grpSp>
+      </p:pic>
     </p:spTree>
     <p:extLst>
       <p:ext uri="{BB962C8B-B14F-4D97-AF65-F5344CB8AC3E}">
-        <p14:creationId xmlns:p14="http://schemas.microsoft.com/office/powerpoint/2010/main" val="150494682"/>
-      </p:ext>
-    </p:extLst>
-  </p:cSld>
-  <p:clrMapOvr>
-    <a:overrideClrMapping bg1="dk1" tx1="lt1" bg2="dk2" tx2="lt2" accent1="accent1" accent2="accent2" accent3="accent3" accent4="accent4" accent5="accent5" accent6="accent6" hlink="hlink" folHlink="folHlink"/>
-  </p:clrMapOvr>
-</p:sld>
-</file>
-
-<file path=ppt/slides/slide5.xml><?xml version="1.0" encoding="utf-8"?>
-<p:sld xmlns:a="http://schemas.openxmlformats.org/drawingml/2006/main" xmlns:r="http://schemas.openxmlformats.org/officeDocument/2006/relationships" xmlns:p="http://schemas.openxmlformats.org/presentationml/2006/main">
-  <p:cSld>
-    <p:spTree>
-      <p:nvGrpSpPr>
-        <p:cNvPr id="1" name=""/>
-        <p:cNvGrpSpPr/>
-        <p:nvPr/>
-      </p:nvGrpSpPr>
-      <p:grpSpPr>
-        <a:xfrm>
-          <a:off x="0" y="0"/>
-          <a:ext cx="0" cy="0"/>
-          <a:chOff x="0" y="0"/>
-          <a:chExt cx="0" cy="0"/>
-        </a:xfrm>
-      </p:grpSpPr>
-      <p:sp>
-        <p:nvSpPr>
-          <p:cNvPr id="2" name="Titel 1">
-            <a:extLst>
-              <a:ext uri="{FF2B5EF4-FFF2-40B4-BE49-F238E27FC236}">
-                <a16:creationId xmlns:a16="http://schemas.microsoft.com/office/drawing/2014/main" id="{357EBEA3-20AD-420F-A81D-402F525CCE22}"/>
-              </a:ext>
-            </a:extLst>
-          </p:cNvPr>
-          <p:cNvSpPr>
-            <a:spLocks noGrp="1"/>
-          </p:cNvSpPr>
-          <p:nvPr>
-            <p:ph type="title"/>
-          </p:nvPr>
-        </p:nvSpPr>
-        <p:spPr>
-          <a:xfrm>
-            <a:off x="1066800" y="0"/>
-            <a:ext cx="10058400" cy="2121408"/>
-          </a:xfrm>
-        </p:spPr>
-        <p:txBody>
-          <a:bodyPr>
-            <a:normAutofit fontScale="90000"/>
-          </a:bodyPr>
-          <a:lstStyle/>
-          <a:p>
-            <a:r>
-              <a:rPr lang="nl-NL"/>
-              <a:t>Rodrigo en Nouafal schrijven (Ömer back-up)</a:t>
-            </a:r>
-            <a:br>
-              <a:rPr lang="nl-NL"/>
-            </a:br>
-            <a:endParaRPr lang="nl-NL" dirty="0"/>
-          </a:p>
-        </p:txBody>
-      </p:sp>
-      <p:sp>
-        <p:nvSpPr>
-          <p:cNvPr id="3" name="Tijdelijke aanduiding voor inhoud 2">
-            <a:extLst>
-              <a:ext uri="{FF2B5EF4-FFF2-40B4-BE49-F238E27FC236}">
-                <a16:creationId xmlns:a16="http://schemas.microsoft.com/office/drawing/2014/main" id="{22CF6164-0611-49BF-AA57-D7DDF9E9D0B0}"/>
-              </a:ext>
-            </a:extLst>
-          </p:cNvPr>
-          <p:cNvSpPr>
-            <a:spLocks noGrp="1"/>
-          </p:cNvSpPr>
-          <p:nvPr>
-            <p:ph idx="1"/>
-          </p:nvPr>
-        </p:nvSpPr>
-        <p:spPr>
-          <a:xfrm>
-            <a:off x="1069848" y="2121408"/>
-            <a:ext cx="10058400" cy="4050792"/>
-          </a:xfrm>
-        </p:spPr>
-        <p:txBody>
-          <a:bodyPr>
-            <a:normAutofit/>
-          </a:bodyPr>
-          <a:lstStyle/>
-          <a:p>
-            <a:pPr marL="0" indent="0">
-              <a:buNone/>
-            </a:pPr>
-            <a:r>
-              <a:rPr lang="nl-NL" sz="2800" dirty="0">
-                <a:latin typeface="+mj-lt"/>
-              </a:rPr>
-              <a:t>Rodrigo en </a:t>
-            </a:r>
-            <a:r>
-              <a:rPr lang="nl-NL" sz="2800" dirty="0" err="1">
-                <a:latin typeface="+mj-lt"/>
-              </a:rPr>
-              <a:t>Naoufal</a:t>
-            </a:r>
-            <a:r>
-              <a:rPr lang="nl-NL" sz="2800" dirty="0">
-                <a:latin typeface="+mj-lt"/>
-              </a:rPr>
-              <a:t> zijn aan het schrijven </a:t>
-            </a:r>
-          </a:p>
-        </p:txBody>
-      </p:sp>
-    </p:spTree>
-    <p:extLst>
-      <p:ext uri="{BB962C8B-B14F-4D97-AF65-F5344CB8AC3E}">
-        <p14:creationId xmlns:p14="http://schemas.microsoft.com/office/powerpoint/2010/main" val="1872284782"/>
+        <p14:creationId xmlns:p14="http://schemas.microsoft.com/office/powerpoint/2010/main" val="2975890406"/>
       </p:ext>
     </p:extLst>
   </p:cSld>
@@ -6129,13 +5153,13 @@
 </p:sld>
 </file>
 
-<file path=ppt/slides/slide6.xml><?xml version="1.0" encoding="utf-8"?>
+<file path=ppt/slides/slide5.xml><?xml version="1.0" encoding="utf-8"?>
 <p:sld xmlns:a="http://schemas.openxmlformats.org/drawingml/2006/main" xmlns:r="http://schemas.openxmlformats.org/officeDocument/2006/relationships" xmlns:p="http://schemas.openxmlformats.org/presentationml/2006/main">
   <p:cSld>
     <p:bg>
       <p:bgPr>
         <a:solidFill>
-          <a:schemeClr val="bg1"/>
+          <a:srgbClr val="00CDFF"/>
         </a:solidFill>
         <a:effectLst/>
       </p:bgPr>
@@ -6154,12 +5178,87 @@
           <a:chExt cx="0" cy="0"/>
         </a:xfrm>
       </p:grpSpPr>
+      <p:sp>
+        <p:nvSpPr>
+          <p:cNvPr id="2" name="Titel 1">
+            <a:extLst>
+              <a:ext uri="{FF2B5EF4-FFF2-40B4-BE49-F238E27FC236}">
+                <a16:creationId xmlns:a16="http://schemas.microsoft.com/office/drawing/2014/main" id="{919E1AC5-285B-490A-AC55-0CABABDD8B85}"/>
+              </a:ext>
+            </a:extLst>
+          </p:cNvPr>
+          <p:cNvSpPr>
+            <a:spLocks noGrp="1"/>
+          </p:cNvSpPr>
+          <p:nvPr>
+            <p:ph type="title"/>
+          </p:nvPr>
+        </p:nvSpPr>
+        <p:spPr>
+          <a:xfrm>
+            <a:off x="1069848" y="484632"/>
+            <a:ext cx="10058400" cy="1453436"/>
+          </a:xfrm>
+        </p:spPr>
+        <p:txBody>
+          <a:bodyPr anchor="ctr">
+            <a:normAutofit/>
+          </a:bodyPr>
+          <a:lstStyle/>
+          <a:p>
+            <a:r>
+              <a:rPr lang="nl-NL" sz="4600" dirty="0">
+                <a:solidFill>
+                  <a:schemeClr val="tx1"/>
+                </a:solidFill>
+              </a:rPr>
+              <a:t>Wat kun je met de </a:t>
+            </a:r>
+            <a:r>
+              <a:rPr lang="nl-NL" sz="4600" dirty="0" err="1">
+                <a:solidFill>
+                  <a:schemeClr val="tx1"/>
+                </a:solidFill>
+              </a:rPr>
+              <a:t>smell</a:t>
+            </a:r>
+            <a:r>
+              <a:rPr lang="nl-NL" sz="4600" dirty="0">
+                <a:solidFill>
+                  <a:schemeClr val="tx1"/>
+                </a:solidFill>
+              </a:rPr>
+              <a:t> </a:t>
+            </a:r>
+            <a:r>
+              <a:rPr lang="nl-NL" sz="4600" dirty="0" err="1">
+                <a:solidFill>
+                  <a:schemeClr val="tx1"/>
+                </a:solidFill>
+              </a:rPr>
+              <a:t>cube</a:t>
+            </a:r>
+            <a:br>
+              <a:rPr lang="nl-NL" sz="4600" dirty="0">
+                <a:solidFill>
+                  <a:schemeClr val="tx1"/>
+                </a:solidFill>
+              </a:rPr>
+            </a:br>
+            <a:endParaRPr lang="nl-NL" sz="4600" dirty="0">
+              <a:solidFill>
+                <a:schemeClr val="tx1"/>
+              </a:solidFill>
+            </a:endParaRPr>
+          </a:p>
+        </p:txBody>
+      </p:sp>
       <p:pic>
         <p:nvPicPr>
-          <p:cNvPr id="5" name="Afbeelding 4" descr="Afbeelding met lucht, persoon, buiten, racket&#10;&#10;Beschrijving is gegenereerd met zeer hoge betrouwbaarheid">
+          <p:cNvPr id="4" name="Afbeelding 3">
             <a:extLst>
               <a:ext uri="{FF2B5EF4-FFF2-40B4-BE49-F238E27FC236}">
-                <a16:creationId xmlns:a16="http://schemas.microsoft.com/office/drawing/2014/main" id="{284B661C-446F-49E0-AB7A-AF296656AF5D}"/>
+                <a16:creationId xmlns:a16="http://schemas.microsoft.com/office/drawing/2014/main" id="{687560D9-AC4A-4956-81A7-EFD7C32B76F1}"/>
               </a:ext>
             </a:extLst>
           </p:cNvPr>
@@ -6168,15 +5267,16 @@
           </p:cNvPicPr>
           <p:nvPr/>
         </p:nvPicPr>
-        <p:blipFill rotWithShape="1">
+        <p:blipFill>
           <a:blip r:embed="rId2"/>
-          <a:srcRect t="17824" b="8886"/>
-          <a:stretch/>
+          <a:stretch>
+            <a:fillRect/>
+          </a:stretch>
         </p:blipFill>
         <p:spPr>
           <a:xfrm>
-            <a:off x="20" y="11"/>
-            <a:ext cx="12191980" cy="6857989"/>
+            <a:off x="7603408" y="2305496"/>
+            <a:ext cx="4069302" cy="3254646"/>
           </a:xfrm>
           <a:prstGeom prst="rect">
             <a:avLst/>
@@ -6185,160 +5285,144 @@
       </p:pic>
       <p:sp>
         <p:nvSpPr>
-          <p:cNvPr id="10" name="Rectangle 9">
+          <p:cNvPr id="3" name="Tijdelijke aanduiding voor inhoud 2">
             <a:extLst>
               <a:ext uri="{FF2B5EF4-FFF2-40B4-BE49-F238E27FC236}">
-                <a16:creationId xmlns:a16="http://schemas.microsoft.com/office/drawing/2014/main" id="{F79FF99C-BAA9-404F-9C96-6DD456B4F795}"/>
-              </a:ext>
-              <a:ext uri="{C183D7F6-B498-43B3-948B-1728B52AA6E4}">
-                <adec:decorative xmlns:adec="http://schemas.microsoft.com/office/drawing/2017/decorative" val="1"/>
+                <a16:creationId xmlns:a16="http://schemas.microsoft.com/office/drawing/2014/main" id="{E2DE8640-3EF0-4725-9CB5-836E4E2DB7B0}"/>
               </a:ext>
             </a:extLst>
           </p:cNvPr>
           <p:cNvSpPr>
-            <a:spLocks noGrp="1" noRot="1" noChangeAspect="1" noMove="1" noResize="1" noEditPoints="1" noAdjustHandles="1" noChangeArrowheads="1" noChangeShapeType="1" noTextEdit="1"/>
-          </p:cNvSpPr>
-          <p:nvPr>
-            <p:extLst>
-              <p:ext uri="{386F3935-93C4-4BCD-93E2-E3B085C9AB24}">
-                <p16:designElem xmlns:p16="http://schemas.microsoft.com/office/powerpoint/2015/main" val="1"/>
-              </p:ext>
-            </p:extLst>
+            <a:spLocks noGrp="1"/>
+          </p:cNvSpPr>
+          <p:nvPr>
+            <p:ph idx="1"/>
           </p:nvPr>
         </p:nvSpPr>
         <p:spPr>
           <a:xfrm>
-            <a:off x="0" y="1"/>
-            <a:ext cx="12192000" cy="6857999"/>
+            <a:off x="1069848" y="2121408"/>
+            <a:ext cx="10058400" cy="4050792"/>
           </a:xfrm>
-          <a:prstGeom prst="rect">
-            <a:avLst/>
-          </a:prstGeom>
-          <a:solidFill>
-            <a:schemeClr val="bg1">
-              <a:alpha val="20000"/>
-            </a:schemeClr>
-          </a:solidFill>
-          <a:ln>
-            <a:noFill/>
-          </a:ln>
         </p:spPr>
-        <p:style>
-          <a:lnRef idx="2">
-            <a:schemeClr val="accent1">
-              <a:shade val="50000"/>
-            </a:schemeClr>
-          </a:lnRef>
-          <a:fillRef idx="1">
-            <a:schemeClr val="accent1"/>
-          </a:fillRef>
-          <a:effectRef idx="0">
-            <a:schemeClr val="accent1"/>
-          </a:effectRef>
-          <a:fontRef idx="minor">
-            <a:schemeClr val="lt1"/>
-          </a:fontRef>
-        </p:style>
-        <p:txBody>
-          <a:bodyPr rtlCol="0" anchor="ctr"/>
+        <p:txBody>
+          <a:bodyPr>
+            <a:normAutofit/>
+          </a:bodyPr>
           <a:lstStyle/>
           <a:p>
-            <a:pPr algn="ctr"/>
-            <a:endParaRPr lang="en-US"/>
-          </a:p>
-        </p:txBody>
-      </p:sp>
-      <p:sp>
-        <p:nvSpPr>
-          <p:cNvPr id="12" name="Rectangle 11">
-            <a:extLst>
-              <a:ext uri="{FF2B5EF4-FFF2-40B4-BE49-F238E27FC236}">
-                <a16:creationId xmlns:a16="http://schemas.microsoft.com/office/drawing/2014/main" id="{49C44AFD-C72D-4D9C-84C6-73E615CED884}"/>
-              </a:ext>
-              <a:ext uri="{C183D7F6-B498-43B3-948B-1728B52AA6E4}">
-                <adec:decorative xmlns:adec="http://schemas.microsoft.com/office/drawing/2017/decorative" val="1"/>
-              </a:ext>
-            </a:extLst>
-          </p:cNvPr>
-          <p:cNvSpPr>
-            <a:spLocks noGrp="1" noRot="1" noChangeAspect="1" noMove="1" noResize="1" noEditPoints="1" noAdjustHandles="1" noChangeArrowheads="1" noChangeShapeType="1" noTextEdit="1"/>
-          </p:cNvSpPr>
-          <p:nvPr>
-            <p:extLst>
-              <p:ext uri="{386F3935-93C4-4BCD-93E2-E3B085C9AB24}">
-                <p16:designElem xmlns:p16="http://schemas.microsoft.com/office/powerpoint/2015/main" val="1"/>
-              </p:ext>
-            </p:extLst>
-          </p:nvPr>
-        </p:nvSpPr>
-        <p:spPr>
-          <a:xfrm>
-            <a:off x="1524" y="0"/>
-            <a:ext cx="12188952" cy="6858000"/>
-          </a:xfrm>
-          <a:prstGeom prst="rect">
-            <a:avLst/>
-          </a:prstGeom>
-          <a:blipFill dpi="0" rotWithShape="1">
-            <a:blip r:embed="rId3">
-              <a:alphaModFix amt="30000"/>
-              <a:duotone>
-                <a:prstClr val="black"/>
-                <a:schemeClr val="accent1">
-                  <a:tint val="45000"/>
-                  <a:satMod val="400000"/>
-                </a:schemeClr>
-              </a:duotone>
-              <a:extLst>
-                <a:ext uri="{BEBA8EAE-BF5A-486C-A8C5-ECC9F3942E4B}">
-                  <a14:imgProps xmlns:a14="http://schemas.microsoft.com/office/drawing/2010/main">
-                    <a14:imgLayer r:embed="rId4">
-                      <a14:imgEffect>
-                        <a14:sharpenSoften amount="61000"/>
-                      </a14:imgEffect>
-                      <a14:imgEffect>
-                        <a14:brightnessContrast bright="-25000" contrast="20000"/>
-                      </a14:imgEffect>
-                    </a14:imgLayer>
-                  </a14:imgProps>
-                </a:ext>
-                <a:ext uri="{28A0092B-C50C-407E-A947-70E740481C1C}">
-                  <a14:useLocalDpi xmlns:a14="http://schemas.microsoft.com/office/drawing/2010/main" val="0"/>
-                </a:ext>
-              </a:extLst>
-            </a:blip>
-            <a:srcRect/>
-            <a:tile tx="0" ty="-762000" sx="92000" sy="89000" flip="xy" algn="ctr"/>
-          </a:blipFill>
-          <a:ln>
-            <a:noFill/>
-          </a:ln>
-        </p:spPr>
-        <p:style>
-          <a:lnRef idx="2">
-            <a:schemeClr val="accent1">
-              <a:shade val="50000"/>
-            </a:schemeClr>
-          </a:lnRef>
-          <a:fillRef idx="1">
-            <a:schemeClr val="accent1"/>
-          </a:fillRef>
-          <a:effectRef idx="0">
-            <a:schemeClr val="accent1"/>
-          </a:effectRef>
-          <a:fontRef idx="minor">
-            <a:schemeClr val="lt1"/>
-          </a:fontRef>
-        </p:style>
-        <p:txBody>
-          <a:bodyPr rtlCol="0" anchor="ctr"/>
-          <a:lstStyle/>
-          <a:p>
-            <a:pPr algn="ctr"/>
-            <a:endParaRPr lang="en-US"/>
-          </a:p>
-        </p:txBody>
-      </p:sp>
+            <a:r>
+              <a:rPr lang="nl-NL" sz="2800" dirty="0">
+                <a:latin typeface="+mj-lt"/>
+              </a:rPr>
+              <a:t>Gassen waarnemen</a:t>
+            </a:r>
+          </a:p>
+          <a:p>
+            <a:pPr marL="0" indent="0">
+              <a:buNone/>
+            </a:pPr>
+            <a:r>
+              <a:rPr lang="nl-NL" sz="2800" dirty="0">
+                <a:latin typeface="+mj-lt"/>
+              </a:rPr>
+              <a:t>	Methaan, Ammonia, Alcohol, Brandbare gassen</a:t>
+            </a:r>
+          </a:p>
+          <a:p>
+            <a:r>
+              <a:rPr lang="nl-NL" sz="2800" dirty="0">
+                <a:latin typeface="+mj-lt"/>
+              </a:rPr>
+              <a:t>Je kunt hem neerzetten op de plek waar hij nodig is</a:t>
+            </a:r>
+          </a:p>
+          <a:p>
+            <a:pPr marL="0" indent="0">
+              <a:buNone/>
+            </a:pPr>
+            <a:r>
+              <a:rPr lang="nl-NL" sz="2800" dirty="0">
+                <a:latin typeface="+mj-lt"/>
+              </a:rPr>
+              <a:t>	Keuken, Stal, Garage</a:t>
+            </a:r>
+          </a:p>
+          <a:p>
+            <a:r>
+              <a:rPr lang="nl-NL" sz="2800" dirty="0">
+                <a:latin typeface="+mj-lt"/>
+              </a:rPr>
+              <a:t>Je kunt hem meenemen om een plek te controleren</a:t>
+            </a:r>
+          </a:p>
+          <a:p>
+            <a:pPr marL="0" indent="0">
+              <a:buNone/>
+            </a:pPr>
+            <a:r>
+              <a:rPr lang="nl-NL" sz="2800" dirty="0">
+                <a:latin typeface="+mj-lt"/>
+              </a:rPr>
+              <a:t>	Buiten, Oppas-situatie</a:t>
+            </a:r>
+          </a:p>
+          <a:p>
+            <a:pPr marL="0" indent="0">
+              <a:buNone/>
+            </a:pPr>
+            <a:endParaRPr lang="nl-NL" sz="2800" dirty="0">
+              <a:latin typeface="+mj-lt"/>
+            </a:endParaRPr>
+          </a:p>
+          <a:p>
+            <a:pPr marL="0" indent="0">
+              <a:buNone/>
+            </a:pPr>
+            <a:endParaRPr lang="nl-NL" sz="2800" dirty="0">
+              <a:latin typeface="+mj-lt"/>
+            </a:endParaRPr>
+          </a:p>
+        </p:txBody>
+      </p:sp>
+    </p:spTree>
+    <p:extLst>
+      <p:ext uri="{BB962C8B-B14F-4D97-AF65-F5344CB8AC3E}">
+        <p14:creationId xmlns:p14="http://schemas.microsoft.com/office/powerpoint/2010/main" val="3732094626"/>
+      </p:ext>
+    </p:extLst>
+  </p:cSld>
+  <p:clrMapOvr>
+    <a:masterClrMapping/>
+  </p:clrMapOvr>
+</p:sld>
+</file>
+
+<file path=ppt/slides/slide6.xml><?xml version="1.0" encoding="utf-8"?>
+<p:sld xmlns:a="http://schemas.openxmlformats.org/drawingml/2006/main" xmlns:r="http://schemas.openxmlformats.org/officeDocument/2006/relationships" xmlns:p="http://schemas.openxmlformats.org/presentationml/2006/main">
+  <p:cSld>
+    <p:bg>
+      <p:bgPr>
+        <a:solidFill>
+          <a:srgbClr val="00CDFF"/>
+        </a:solidFill>
+        <a:effectLst/>
+      </p:bgPr>
+    </p:bg>
+    <p:spTree>
+      <p:nvGrpSpPr>
+        <p:cNvPr id="1" name=""/>
+        <p:cNvGrpSpPr/>
+        <p:nvPr/>
+      </p:nvGrpSpPr>
+      <p:grpSpPr>
+        <a:xfrm>
+          <a:off x="0" y="0"/>
+          <a:ext cx="0" cy="0"/>
+          <a:chOff x="0" y="0"/>
+          <a:chExt cx="0" cy="0"/>
+        </a:xfrm>
+      </p:grpSpPr>
       <p:sp>
         <p:nvSpPr>
           <p:cNvPr id="2" name="Titel 1">
@@ -6368,21 +5452,61 @@
           <a:lstStyle/>
           <a:p>
             <a:r>
-              <a:rPr lang="nl-NL" sz="3400">
+              <a:rPr lang="nl-NL" sz="4800" dirty="0">
                 <a:solidFill>
                   <a:schemeClr val="tx1"/>
                 </a:solidFill>
               </a:rPr>
-              <a:t>Hoe is het contact van ons team en hoe werken we samen en zijn we nog compleet?</a:t>
-            </a:r>
-            <a:br>
-              <a:rPr lang="nl-NL" sz="3400">
+              <a:t>Hoe is de </a:t>
+            </a:r>
+            <a:r>
+              <a:rPr lang="nl-NL" sz="4800" dirty="0" err="1">
                 <a:solidFill>
                   <a:schemeClr val="tx1"/>
                 </a:solidFill>
               </a:rPr>
+              <a:t>smell</a:t>
+            </a:r>
+            <a:r>
+              <a:rPr lang="nl-NL" sz="4800" dirty="0">
+                <a:solidFill>
+                  <a:schemeClr val="tx1"/>
+                </a:solidFill>
+              </a:rPr>
+              <a:t> </a:t>
+            </a:r>
+            <a:r>
+              <a:rPr lang="nl-NL" sz="4800" dirty="0" err="1">
+                <a:solidFill>
+                  <a:schemeClr val="tx1"/>
+                </a:solidFill>
+              </a:rPr>
+              <a:t>cube</a:t>
+            </a:r>
+            <a:r>
+              <a:rPr lang="nl-NL" sz="4800" dirty="0">
+                <a:solidFill>
+                  <a:schemeClr val="tx1"/>
+                </a:solidFill>
+              </a:rPr>
+              <a:t> </a:t>
+            </a:r>
+            <a:r>
+              <a:rPr lang="nl-NL" sz="4800" dirty="0" err="1">
+                <a:solidFill>
+                  <a:schemeClr val="tx1"/>
+                </a:solidFill>
+              </a:rPr>
+              <a:t>gEmaakt</a:t>
+            </a:r>
+            <a:br>
+              <a:rPr lang="nl-NL" sz="3400" dirty="0">
+                <a:solidFill>
+                  <a:schemeClr val="tx1"/>
+                </a:solidFill>
+              </a:rPr>
             </a:br>
-            <a:endParaRPr lang="nl-NL" sz="3400">
+            <a:endParaRPr lang="nl-NL" sz="3400" dirty="0">
               <a:solidFill>
                 <a:schemeClr val="tx1"/>
               </a:solidFill>
@@ -6392,10 +5516,10 @@
       </p:sp>
       <p:sp>
         <p:nvSpPr>
-          <p:cNvPr id="3" name="Tijdelijke aanduiding voor inhoud 2">
+          <p:cNvPr id="6" name="Tijdelijke aanduiding voor inhoud 5">
             <a:extLst>
               <a:ext uri="{FF2B5EF4-FFF2-40B4-BE49-F238E27FC236}">
-                <a16:creationId xmlns:a16="http://schemas.microsoft.com/office/drawing/2014/main" id="{0BCB2F1B-4AB0-4D66-9C21-BB982B214956}"/>
+                <a16:creationId xmlns:a16="http://schemas.microsoft.com/office/drawing/2014/main" id="{8C56A7AD-07FE-4EC4-A7BF-23F6CC839440}"/>
               </a:ext>
             </a:extLst>
           </p:cNvPr>
@@ -6406,234 +5530,517 @@
             <p:ph idx="1"/>
           </p:nvPr>
         </p:nvSpPr>
-        <p:spPr>
-          <a:xfrm>
-            <a:off x="1069848" y="2121408"/>
-            <a:ext cx="10058400" cy="4050792"/>
-          </a:xfrm>
-        </p:spPr>
+        <p:spPr/>
         <p:txBody>
           <a:bodyPr>
-            <a:normAutofit/>
+            <a:normAutofit lnSpcReduction="10000"/>
           </a:bodyPr>
           <a:lstStyle/>
           <a:p>
-            <a:pPr marL="0" indent="0">
-              <a:buNone/>
-            </a:pPr>
             <a:r>
               <a:rPr lang="nl-NL" sz="2800" dirty="0">
                 <a:latin typeface="+mj-lt"/>
               </a:rPr>
-              <a:t>de contact tussen ons team is best goed 4/5 van ons team is er altijd, en de ander is de afgelopen dagen niet komen opdagen. Dus daarom is het wat chaotischer omdat we een man te kort komen. Dus daarom staat er bij bijna alles de naam van diegene met de back-up die dus invalt en helpt.</a:t>
-            </a:r>
-          </a:p>
-        </p:txBody>
-      </p:sp>
-      <p:grpSp>
-        <p:nvGrpSpPr>
-          <p:cNvPr id="14" name="Group 13">
+              <a:t>3D-tekeningen in </a:t>
+            </a:r>
+            <a:r>
+              <a:rPr lang="nl-NL" sz="2800" dirty="0" err="1">
+                <a:latin typeface="+mj-lt"/>
+              </a:rPr>
+              <a:t>SketchUp</a:t>
+            </a:r>
+            <a:endParaRPr lang="nl-NL" sz="2800" dirty="0">
+              <a:latin typeface="+mj-lt"/>
+            </a:endParaRPr>
+          </a:p>
+          <a:p>
+            <a:pPr marL="0" indent="0">
+              <a:buNone/>
+            </a:pPr>
+            <a:r>
+              <a:rPr lang="nl-NL" sz="2800" dirty="0">
+                <a:latin typeface="+mj-lt"/>
+              </a:rPr>
+              <a:t>	</a:t>
+            </a:r>
+            <a:r>
+              <a:rPr lang="nl-NL" sz="2800" dirty="0" err="1">
+                <a:latin typeface="+mj-lt"/>
+              </a:rPr>
+              <a:t>Ekrem</a:t>
+            </a:r>
+            <a:r>
+              <a:rPr lang="nl-NL" sz="2800" dirty="0">
+                <a:latin typeface="+mj-lt"/>
+              </a:rPr>
+              <a:t> en </a:t>
+            </a:r>
+            <a:r>
+              <a:rPr lang="nl-NL" sz="2800" dirty="0" err="1">
+                <a:latin typeface="+mj-lt"/>
+              </a:rPr>
+              <a:t>Ömer</a:t>
+            </a:r>
+            <a:endParaRPr lang="nl-NL" sz="2800" dirty="0">
+              <a:latin typeface="+mj-lt"/>
+            </a:endParaRPr>
+          </a:p>
+          <a:p>
+            <a:r>
+              <a:rPr lang="nl-NL" sz="2800" dirty="0">
+                <a:latin typeface="+mj-lt"/>
+              </a:rPr>
+              <a:t>Solderen</a:t>
+            </a:r>
+          </a:p>
+          <a:p>
+            <a:pPr marL="0" indent="0">
+              <a:buNone/>
+            </a:pPr>
+            <a:r>
+              <a:rPr lang="nl-NL" sz="2800" dirty="0">
+                <a:latin typeface="+mj-lt"/>
+              </a:rPr>
+              <a:t>	</a:t>
+            </a:r>
+            <a:r>
+              <a:rPr lang="nl-NL" sz="2800" dirty="0" err="1">
+                <a:latin typeface="+mj-lt"/>
+              </a:rPr>
+              <a:t>Ekrem</a:t>
+            </a:r>
+            <a:r>
+              <a:rPr lang="nl-NL" sz="2800" dirty="0">
+                <a:latin typeface="+mj-lt"/>
+              </a:rPr>
+              <a:t> en </a:t>
+            </a:r>
+            <a:r>
+              <a:rPr lang="nl-NL" sz="2800" dirty="0" err="1">
+                <a:latin typeface="+mj-lt"/>
+              </a:rPr>
+              <a:t>Ömer</a:t>
+            </a:r>
+            <a:endParaRPr lang="nl-NL" sz="2800" dirty="0">
+              <a:latin typeface="+mj-lt"/>
+            </a:endParaRPr>
+          </a:p>
+          <a:p>
+            <a:r>
+              <a:rPr lang="nl-NL" sz="2800" dirty="0">
+                <a:latin typeface="+mj-lt"/>
+              </a:rPr>
+              <a:t>Programmeren in </a:t>
+            </a:r>
+            <a:r>
+              <a:rPr lang="nl-NL" sz="2800" dirty="0" err="1">
+                <a:latin typeface="+mj-lt"/>
+              </a:rPr>
+              <a:t>Qt</a:t>
+            </a:r>
+            <a:endParaRPr lang="nl-NL" sz="2800" dirty="0">
+              <a:latin typeface="+mj-lt"/>
+            </a:endParaRPr>
+          </a:p>
+          <a:p>
+            <a:pPr marL="0" indent="0">
+              <a:buNone/>
+            </a:pPr>
+            <a:r>
+              <a:rPr lang="nl-NL" sz="2800" dirty="0">
+                <a:latin typeface="+mj-lt"/>
+              </a:rPr>
+              <a:t>	Jesse</a:t>
+            </a:r>
+          </a:p>
+          <a:p>
+            <a:r>
+              <a:rPr lang="nl-NL" sz="2800" dirty="0">
+                <a:latin typeface="+mj-lt"/>
+              </a:rPr>
+              <a:t>Presentatie</a:t>
+            </a:r>
+          </a:p>
+          <a:p>
+            <a:pPr marL="0" indent="0">
+              <a:buNone/>
+            </a:pPr>
+            <a:r>
+              <a:rPr lang="nl-NL" sz="2800" dirty="0">
+                <a:latin typeface="+mj-lt"/>
+              </a:rPr>
+              <a:t>	</a:t>
+            </a:r>
+            <a:r>
+              <a:rPr lang="nl-NL" sz="2800" dirty="0" err="1">
+                <a:latin typeface="+mj-lt"/>
+              </a:rPr>
+              <a:t>Naoufal</a:t>
+            </a:r>
+            <a:r>
+              <a:rPr lang="nl-NL" sz="2800" dirty="0">
+                <a:latin typeface="+mj-lt"/>
+              </a:rPr>
+              <a:t> en Rodrigo</a:t>
+            </a:r>
+          </a:p>
+          <a:p>
+            <a:pPr marL="0" indent="0">
+              <a:buNone/>
+            </a:pPr>
+            <a:endParaRPr lang="nl-NL" dirty="0"/>
+          </a:p>
+        </p:txBody>
+      </p:sp>
+      <p:pic>
+        <p:nvPicPr>
+          <p:cNvPr id="8" name="Afbeelding 7">
             <a:extLst>
               <a:ext uri="{FF2B5EF4-FFF2-40B4-BE49-F238E27FC236}">
-                <a16:creationId xmlns:a16="http://schemas.microsoft.com/office/drawing/2014/main" id="{1D25B14F-36E0-41E8-956F-CABEF1ADD65F}"/>
-              </a:ext>
-              <a:ext uri="{C183D7F6-B498-43B3-948B-1728B52AA6E4}">
-                <adec:decorative xmlns:adec="http://schemas.microsoft.com/office/drawing/2017/decorative" val="1"/>
+                <a16:creationId xmlns:a16="http://schemas.microsoft.com/office/drawing/2014/main" id="{950DBD65-E292-4A99-BB97-8A2197A2CA4C}"/>
               </a:ext>
             </a:extLst>
           </p:cNvPr>
-          <p:cNvGrpSpPr>
-            <a:grpSpLocks noGrp="1" noUngrp="1" noRot="1" noChangeAspect="1" noMove="1" noResize="1"/>
-          </p:cNvGrpSpPr>
-          <p:nvPr>
-            <p:extLst>
-              <p:ext uri="{386F3935-93C4-4BCD-93E2-E3B085C9AB24}">
-                <p16:designElem xmlns:p16="http://schemas.microsoft.com/office/powerpoint/2015/main" val="1"/>
-              </p:ext>
-            </p:extLst>
-          </p:nvPr>
-        </p:nvGrpSpPr>
-        <p:grpSpPr>
+          <p:cNvPicPr>
+            <a:picLocks noChangeAspect="1"/>
+          </p:cNvPicPr>
+          <p:nvPr/>
+        </p:nvPicPr>
+        <p:blipFill>
+          <a:blip r:embed="rId2"/>
+          <a:stretch>
+            <a:fillRect/>
+          </a:stretch>
+        </p:blipFill>
+        <p:spPr>
           <a:xfrm>
-            <a:off x="11401725" y="6229681"/>
-            <a:ext cx="457200" cy="457200"/>
-            <a:chOff x="11361456" y="6195813"/>
-            <a:chExt cx="548640" cy="548640"/>
+            <a:off x="6417062" y="2007302"/>
+            <a:ext cx="3520252" cy="4366066"/>
           </a:xfrm>
-        </p:grpSpPr>
-        <p:sp>
-          <p:nvSpPr>
-            <p:cNvPr id="15" name="Oval 14">
-              <a:extLst>
-                <a:ext uri="{FF2B5EF4-FFF2-40B4-BE49-F238E27FC236}">
-                  <a16:creationId xmlns:a16="http://schemas.microsoft.com/office/drawing/2014/main" id="{4AFB9EA5-DE4D-4E6B-A302-F55174E4B19A}"/>
-                </a:ext>
-                <a:ext uri="{C183D7F6-B498-43B3-948B-1728B52AA6E4}">
-                  <adec:decorative xmlns:adec="http://schemas.microsoft.com/office/drawing/2017/decorative" val="1"/>
-                </a:ext>
-              </a:extLst>
-            </p:cNvPr>
-            <p:cNvSpPr/>
-            <p:nvPr>
-              <p:extLst>
-                <p:ext uri="{386F3935-93C4-4BCD-93E2-E3B085C9AB24}">
-                  <p16:designElem xmlns:p16="http://schemas.microsoft.com/office/powerpoint/2015/main" val="1"/>
-                </p:ext>
-              </p:extLst>
-            </p:nvPr>
-          </p:nvSpPr>
-          <p:spPr>
-            <a:xfrm>
-              <a:off x="11361456" y="6195813"/>
-              <a:ext cx="548640" cy="548640"/>
-            </a:xfrm>
-            <a:prstGeom prst="ellipse">
-              <a:avLst/>
-            </a:prstGeom>
-            <a:blipFill dpi="0" rotWithShape="1">
-              <a:blip r:embed="rId5">
-                <a:duotone>
-                  <a:schemeClr val="accent1">
-                    <a:shade val="45000"/>
-                    <a:satMod val="135000"/>
-                  </a:schemeClr>
-                  <a:prstClr val="white"/>
-                </a:duotone>
-                <a:extLst/>
-              </a:blip>
-              <a:srcRect/>
-              <a:tile tx="50800" ty="0" sx="85000" sy="85000" flip="none" algn="tl"/>
-            </a:blipFill>
-            <a:ln w="25400" cap="flat" cmpd="sng" algn="ctr">
-              <a:noFill/>
-              <a:prstDash val="solid"/>
-            </a:ln>
-            <a:effectLst/>
-          </p:spPr>
-          <p:txBody>
-            <a:bodyPr lIns="0" tIns="0" rIns="0" bIns="0" rtlCol="0" anchor="ctr"/>
-            <a:lstStyle/>
-            <a:p>
-              <a:pPr marL="0" marR="0" lvl="0" indent="0" algn="ctr" defTabSz="914400" eaLnBrk="1" fontAlgn="auto" latinLnBrk="0" hangingPunct="1">
-                <a:lnSpc>
-                  <a:spcPct val="100000"/>
-                </a:lnSpc>
-                <a:spcBef>
-                  <a:spcPts val="0"/>
-                </a:spcBef>
-                <a:spcAft>
-                  <a:spcPts val="0"/>
-                </a:spcAft>
-                <a:buClrTx/>
-                <a:buSzTx/>
-                <a:buFontTx/>
-                <a:buNone/>
-                <a:tabLst/>
-                <a:defRPr/>
-              </a:pPr>
-              <a:endParaRPr kumimoji="0" lang="en-US" sz="2000" b="0" i="0" u="none" strike="noStrike" kern="0" cap="none" spc="0" normalizeH="0" baseline="0" noProof="0" dirty="0">
-                <a:ln>
-                  <a:noFill/>
-                </a:ln>
-                <a:solidFill>
-                  <a:prstClr val="white"/>
-                </a:solidFill>
-                <a:effectLst/>
-                <a:uLnTx/>
-                <a:uFillTx/>
-                <a:latin typeface="Rockwell Extra Bold" pitchFamily="18" charset="0"/>
-                <a:ea typeface="+mn-ea"/>
-                <a:cs typeface="+mn-cs"/>
-              </a:endParaRPr>
-            </a:p>
-          </p:txBody>
-        </p:sp>
-        <p:sp>
-          <p:nvSpPr>
-            <p:cNvPr id="16" name="Oval 15">
-              <a:extLst>
-                <a:ext uri="{FF2B5EF4-FFF2-40B4-BE49-F238E27FC236}">
-                  <a16:creationId xmlns:a16="http://schemas.microsoft.com/office/drawing/2014/main" id="{E44092F4-4D9B-4D0A-8832-C29E786F8F03}"/>
-                </a:ext>
-                <a:ext uri="{C183D7F6-B498-43B3-948B-1728B52AA6E4}">
-                  <adec:decorative xmlns:adec="http://schemas.microsoft.com/office/drawing/2017/decorative" val="1"/>
-                </a:ext>
-              </a:extLst>
-            </p:cNvPr>
-            <p:cNvSpPr/>
-            <p:nvPr>
-              <p:extLst>
-                <p:ext uri="{386F3935-93C4-4BCD-93E2-E3B085C9AB24}">
-                  <p16:designElem xmlns:p16="http://schemas.microsoft.com/office/powerpoint/2015/main" val="1"/>
-                </p:ext>
-              </p:extLst>
-            </p:nvPr>
-          </p:nvSpPr>
-          <p:spPr>
-            <a:xfrm>
-              <a:off x="11396488" y="6230844"/>
-              <a:ext cx="478576" cy="478578"/>
-            </a:xfrm>
-            <a:prstGeom prst="ellipse">
-              <a:avLst/>
-            </a:prstGeom>
-            <a:noFill/>
-            <a:ln w="12700" cap="flat" cmpd="sng" algn="ctr">
-              <a:solidFill>
-                <a:srgbClr val="FFFFFF"/>
-              </a:solidFill>
-              <a:prstDash val="solid"/>
-            </a:ln>
-            <a:effectLst/>
-          </p:spPr>
-          <p:txBody>
-            <a:bodyPr rtlCol="0" anchor="ctr"/>
-            <a:lstStyle/>
-            <a:p>
-              <a:pPr marL="0" marR="0" lvl="0" indent="0" algn="ctr" defTabSz="914400" eaLnBrk="1" fontAlgn="auto" latinLnBrk="0" hangingPunct="1">
-                <a:lnSpc>
-                  <a:spcPct val="100000"/>
-                </a:lnSpc>
-                <a:spcBef>
-                  <a:spcPts val="0"/>
-                </a:spcBef>
-                <a:spcAft>
-                  <a:spcPts val="0"/>
-                </a:spcAft>
-                <a:buClrTx/>
-                <a:buSzTx/>
-                <a:buFontTx/>
-                <a:buNone/>
-                <a:tabLst/>
-                <a:defRPr/>
-              </a:pPr>
-              <a:endParaRPr kumimoji="0" lang="en-US" sz="1800" b="0" i="0" u="none" strike="noStrike" kern="0" cap="none" spc="0" normalizeH="0" baseline="0" noProof="0" dirty="0">
-                <a:ln>
-                  <a:noFill/>
-                </a:ln>
-                <a:solidFill>
-                  <a:prstClr val="white"/>
-                </a:solidFill>
-                <a:effectLst/>
-                <a:uLnTx/>
-                <a:uFillTx/>
-                <a:latin typeface="Calibri"/>
-                <a:ea typeface="+mn-ea"/>
-                <a:cs typeface="+mn-cs"/>
-              </a:endParaRPr>
-            </a:p>
-          </p:txBody>
-        </p:sp>
-      </p:grpSp>
+          <a:prstGeom prst="rect">
+            <a:avLst/>
+          </a:prstGeom>
+        </p:spPr>
+      </p:pic>
     </p:spTree>
     <p:extLst>
       <p:ext uri="{BB962C8B-B14F-4D97-AF65-F5344CB8AC3E}">
-        <p14:creationId xmlns:p14="http://schemas.microsoft.com/office/powerpoint/2010/main" val="2508565275"/>
+        <p14:creationId xmlns:p14="http://schemas.microsoft.com/office/powerpoint/2010/main" val="2837798249"/>
       </p:ext>
     </p:extLst>
   </p:cSld>
   <p:clrMapOvr>
-    <a:overrideClrMapping bg1="dk1" tx1="lt1" bg2="dk2" tx2="lt2" accent1="accent1" accent2="accent2" accent3="accent3" accent4="accent4" accent5="accent5" accent6="accent6" hlink="hlink" folHlink="folHlink"/>
+    <a:masterClrMapping/>
+  </p:clrMapOvr>
+</p:sld>
+</file>
+
+<file path=ppt/slides/slide7.xml><?xml version="1.0" encoding="utf-8"?>
+<p:sld xmlns:a="http://schemas.openxmlformats.org/drawingml/2006/main" xmlns:r="http://schemas.openxmlformats.org/officeDocument/2006/relationships" xmlns:p="http://schemas.openxmlformats.org/presentationml/2006/main">
+  <p:cSld>
+    <p:bg>
+      <p:bgPr>
+        <a:solidFill>
+          <a:srgbClr val="00CDFF"/>
+        </a:solidFill>
+        <a:effectLst/>
+      </p:bgPr>
+    </p:bg>
+    <p:spTree>
+      <p:nvGrpSpPr>
+        <p:cNvPr id="1" name=""/>
+        <p:cNvGrpSpPr/>
+        <p:nvPr/>
+      </p:nvGrpSpPr>
+      <p:grpSpPr>
+        <a:xfrm>
+          <a:off x="0" y="0"/>
+          <a:ext cx="0" cy="0"/>
+          <a:chOff x="0" y="0"/>
+          <a:chExt cx="0" cy="0"/>
+        </a:xfrm>
+      </p:grpSpPr>
+      <p:sp>
+        <p:nvSpPr>
+          <p:cNvPr id="2" name="Titel 1">
+            <a:extLst>
+              <a:ext uri="{FF2B5EF4-FFF2-40B4-BE49-F238E27FC236}">
+                <a16:creationId xmlns:a16="http://schemas.microsoft.com/office/drawing/2014/main" id="{57741EC2-F594-40CE-B27E-49F5A2C367B3}"/>
+              </a:ext>
+            </a:extLst>
+          </p:cNvPr>
+          <p:cNvSpPr>
+            <a:spLocks noGrp="1"/>
+          </p:cNvSpPr>
+          <p:nvPr>
+            <p:ph type="title"/>
+          </p:nvPr>
+        </p:nvSpPr>
+        <p:spPr>
+          <a:xfrm>
+            <a:off x="1069848" y="484632"/>
+            <a:ext cx="10058400" cy="1609344"/>
+          </a:xfrm>
+        </p:spPr>
+        <p:txBody>
+          <a:bodyPr anchor="ctr">
+            <a:normAutofit/>
+          </a:bodyPr>
+          <a:lstStyle/>
+          <a:p>
+            <a:r>
+              <a:rPr lang="nl-NL" sz="4800" dirty="0">
+                <a:solidFill>
+                  <a:schemeClr val="tx1"/>
+                </a:solidFill>
+              </a:rPr>
+              <a:t>Verbeteringen in de toekomst</a:t>
+            </a:r>
+            <a:br>
+              <a:rPr lang="nl-NL" sz="3400" dirty="0">
+                <a:solidFill>
+                  <a:schemeClr val="tx1"/>
+                </a:solidFill>
+              </a:rPr>
+            </a:br>
+            <a:endParaRPr lang="nl-NL" sz="3400" dirty="0">
+              <a:solidFill>
+                <a:schemeClr val="tx1"/>
+              </a:solidFill>
+            </a:endParaRPr>
+          </a:p>
+        </p:txBody>
+      </p:sp>
+      <p:sp>
+        <p:nvSpPr>
+          <p:cNvPr id="6" name="Tijdelijke aanduiding voor inhoud 5">
+            <a:extLst>
+              <a:ext uri="{FF2B5EF4-FFF2-40B4-BE49-F238E27FC236}">
+                <a16:creationId xmlns:a16="http://schemas.microsoft.com/office/drawing/2014/main" id="{8C56A7AD-07FE-4EC4-A7BF-23F6CC839440}"/>
+              </a:ext>
+            </a:extLst>
+          </p:cNvPr>
+          <p:cNvSpPr>
+            <a:spLocks noGrp="1"/>
+          </p:cNvSpPr>
+          <p:nvPr>
+            <p:ph idx="1"/>
+          </p:nvPr>
+        </p:nvSpPr>
+        <p:spPr/>
+        <p:txBody>
+          <a:bodyPr/>
+          <a:lstStyle/>
+          <a:p>
+            <a:r>
+              <a:rPr lang="nl-NL" sz="2800" dirty="0">
+                <a:latin typeface="+mj-lt"/>
+              </a:rPr>
+              <a:t>Misschien niet doorzichtig</a:t>
+            </a:r>
+          </a:p>
+          <a:p>
+            <a:r>
+              <a:rPr lang="nl-NL" sz="2800" dirty="0">
+                <a:latin typeface="+mj-lt"/>
+              </a:rPr>
+              <a:t>Eén lampje om te waarschuwen</a:t>
+            </a:r>
+          </a:p>
+          <a:p>
+            <a:r>
+              <a:rPr lang="nl-NL" sz="2800" dirty="0">
+                <a:latin typeface="+mj-lt"/>
+              </a:rPr>
+              <a:t>Aan-uit knop voor het </a:t>
+            </a:r>
+            <a:r>
+              <a:rPr lang="nl-NL" sz="2800" dirty="0" err="1">
+                <a:latin typeface="+mj-lt"/>
+              </a:rPr>
+              <a:t>raspberry</a:t>
+            </a:r>
+            <a:r>
+              <a:rPr lang="nl-NL" sz="2800" dirty="0">
+                <a:latin typeface="+mj-lt"/>
+              </a:rPr>
+              <a:t>-doosje</a:t>
+            </a:r>
+          </a:p>
+          <a:p>
+            <a:r>
+              <a:rPr lang="nl-NL" sz="2800" dirty="0">
+                <a:latin typeface="+mj-lt"/>
+              </a:rPr>
+              <a:t>Gemakkelijk sensoren kunnen wisselen</a:t>
+            </a:r>
+            <a:r>
+              <a:rPr lang="nl-NL" dirty="0"/>
+              <a:t>	</a:t>
+            </a:r>
+          </a:p>
+        </p:txBody>
+      </p:sp>
+      <p:pic>
+        <p:nvPicPr>
+          <p:cNvPr id="8" name="Afbeelding 7">
+            <a:extLst>
+              <a:ext uri="{FF2B5EF4-FFF2-40B4-BE49-F238E27FC236}">
+                <a16:creationId xmlns:a16="http://schemas.microsoft.com/office/drawing/2014/main" id="{E784ED80-09B0-4356-A20F-56F030D7636F}"/>
+              </a:ext>
+            </a:extLst>
+          </p:cNvPr>
+          <p:cNvPicPr>
+            <a:picLocks noChangeAspect="1"/>
+          </p:cNvPicPr>
+          <p:nvPr/>
+        </p:nvPicPr>
+        <p:blipFill>
+          <a:blip r:embed="rId2"/>
+          <a:stretch>
+            <a:fillRect/>
+          </a:stretch>
+        </p:blipFill>
+        <p:spPr>
+          <a:xfrm>
+            <a:off x="6972966" y="1813162"/>
+            <a:ext cx="2705120" cy="4667284"/>
+          </a:xfrm>
+          <a:prstGeom prst="rect">
+            <a:avLst/>
+          </a:prstGeom>
+        </p:spPr>
+      </p:pic>
+      <p:pic>
+        <p:nvPicPr>
+          <p:cNvPr id="5" name="Afbeelding 4">
+            <a:extLst>
+              <a:ext uri="{FF2B5EF4-FFF2-40B4-BE49-F238E27FC236}">
+                <a16:creationId xmlns:a16="http://schemas.microsoft.com/office/drawing/2014/main" id="{EC6922BF-5330-400D-B534-CEB005E0B1A3}"/>
+              </a:ext>
+            </a:extLst>
+          </p:cNvPr>
+          <p:cNvPicPr>
+            <a:picLocks noChangeAspect="1"/>
+          </p:cNvPicPr>
+          <p:nvPr/>
+        </p:nvPicPr>
+        <p:blipFill>
+          <a:blip r:embed="rId3"/>
+          <a:stretch>
+            <a:fillRect/>
+          </a:stretch>
+        </p:blipFill>
+        <p:spPr>
+          <a:xfrm>
+            <a:off x="8991347" y="2212131"/>
+            <a:ext cx="2210053" cy="2200844"/>
+          </a:xfrm>
+          <a:prstGeom prst="rect">
+            <a:avLst/>
+          </a:prstGeom>
+        </p:spPr>
+      </p:pic>
+    </p:spTree>
+    <p:extLst>
+      <p:ext uri="{BB962C8B-B14F-4D97-AF65-F5344CB8AC3E}">
+        <p14:creationId xmlns:p14="http://schemas.microsoft.com/office/powerpoint/2010/main" val="3015570263"/>
+      </p:ext>
+    </p:extLst>
+  </p:cSld>
+  <p:clrMapOvr>
+    <a:masterClrMapping/>
+  </p:clrMapOvr>
+</p:sld>
+</file>
+
+<file path=ppt/slides/slide8.xml><?xml version="1.0" encoding="utf-8"?>
+<p:sld xmlns:a="http://schemas.openxmlformats.org/drawingml/2006/main" xmlns:r="http://schemas.openxmlformats.org/officeDocument/2006/relationships" xmlns:p="http://schemas.openxmlformats.org/presentationml/2006/main">
+  <p:cSld>
+    <p:bg>
+      <p:bgPr>
+        <a:solidFill>
+          <a:srgbClr val="00CDFF"/>
+        </a:solidFill>
+        <a:effectLst/>
+      </p:bgPr>
+    </p:bg>
+    <p:spTree>
+      <p:nvGrpSpPr>
+        <p:cNvPr id="1" name=""/>
+        <p:cNvGrpSpPr/>
+        <p:nvPr/>
+      </p:nvGrpSpPr>
+      <p:grpSpPr>
+        <a:xfrm>
+          <a:off x="0" y="0"/>
+          <a:ext cx="0" cy="0"/>
+          <a:chOff x="0" y="0"/>
+          <a:chExt cx="0" cy="0"/>
+        </a:xfrm>
+      </p:grpSpPr>
+      <p:sp>
+        <p:nvSpPr>
+          <p:cNvPr id="2" name="Titel 1">
+            <a:extLst>
+              <a:ext uri="{FF2B5EF4-FFF2-40B4-BE49-F238E27FC236}">
+                <a16:creationId xmlns:a16="http://schemas.microsoft.com/office/drawing/2014/main" id="{E1DACD94-3A85-4D64-8506-16B42C1759B4}"/>
+              </a:ext>
+            </a:extLst>
+          </p:cNvPr>
+          <p:cNvSpPr>
+            <a:spLocks noGrp="1"/>
+          </p:cNvSpPr>
+          <p:nvPr>
+            <p:ph type="title"/>
+          </p:nvPr>
+        </p:nvSpPr>
+        <p:spPr/>
+        <p:txBody>
+          <a:bodyPr/>
+          <a:lstStyle/>
+          <a:p>
+            <a:r>
+              <a:rPr lang="nl-NL"/>
+              <a:t>Vragen en tips</a:t>
+            </a:r>
+          </a:p>
+        </p:txBody>
+      </p:sp>
+      <p:sp>
+        <p:nvSpPr>
+          <p:cNvPr id="3" name="Tijdelijke aanduiding voor inhoud 2">
+            <a:extLst>
+              <a:ext uri="{FF2B5EF4-FFF2-40B4-BE49-F238E27FC236}">
+                <a16:creationId xmlns:a16="http://schemas.microsoft.com/office/drawing/2014/main" id="{27137499-A06F-48AB-BC3E-AD00A299A9A3}"/>
+              </a:ext>
+            </a:extLst>
+          </p:cNvPr>
+          <p:cNvSpPr>
+            <a:spLocks noGrp="1"/>
+          </p:cNvSpPr>
+          <p:nvPr>
+            <p:ph idx="1"/>
+          </p:nvPr>
+        </p:nvSpPr>
+        <p:spPr/>
+        <p:txBody>
+          <a:bodyPr/>
+          <a:lstStyle/>
+          <a:p>
+            <a:endParaRPr lang="nl-NL"/>
+          </a:p>
+        </p:txBody>
+      </p:sp>
+    </p:spTree>
+    <p:extLst>
+      <p:ext uri="{BB962C8B-B14F-4D97-AF65-F5344CB8AC3E}">
+        <p14:creationId xmlns:p14="http://schemas.microsoft.com/office/powerpoint/2010/main" val="2664712365"/>
+      </p:ext>
+    </p:extLst>
+  </p:cSld>
+  <p:clrMapOvr>
+    <a:masterClrMapping/>
   </p:clrMapOvr>
 </p:sld>
 </file>

</xml_diff>